<commit_message>
Added an updated intro side
</commit_message>
<xml_diff>
--- a/C# Threading.pptx
+++ b/C# Threading.pptx
@@ -5,35 +5,37 @@
     <p:sldMasterId id="2147483654" r:id="rId1"/>
   </p:sldMasterIdLst>
   <p:notesMasterIdLst>
-    <p:notesMasterId r:id="rId28"/>
+    <p:notesMasterId r:id="rId30"/>
   </p:notesMasterIdLst>
   <p:sldIdLst>
-    <p:sldId id="256" r:id="rId2"/>
-    <p:sldId id="257" r:id="rId3"/>
-    <p:sldId id="258" r:id="rId4"/>
-    <p:sldId id="259" r:id="rId5"/>
-    <p:sldId id="278" r:id="rId6"/>
-    <p:sldId id="260" r:id="rId7"/>
-    <p:sldId id="261" r:id="rId8"/>
-    <p:sldId id="263" r:id="rId9"/>
-    <p:sldId id="264" r:id="rId10"/>
-    <p:sldId id="265" r:id="rId11"/>
-    <p:sldId id="266" r:id="rId12"/>
-    <p:sldId id="267" r:id="rId13"/>
-    <p:sldId id="268" r:id="rId14"/>
-    <p:sldId id="269" r:id="rId15"/>
-    <p:sldId id="270" r:id="rId16"/>
-    <p:sldId id="277" r:id="rId17"/>
-    <p:sldId id="271" r:id="rId18"/>
-    <p:sldId id="282" r:id="rId19"/>
-    <p:sldId id="272" r:id="rId20"/>
-    <p:sldId id="273" r:id="rId21"/>
-    <p:sldId id="274" r:id="rId22"/>
-    <p:sldId id="283" r:id="rId23"/>
-    <p:sldId id="276" r:id="rId24"/>
-    <p:sldId id="279" r:id="rId25"/>
-    <p:sldId id="280" r:id="rId26"/>
-    <p:sldId id="281" r:id="rId27"/>
+    <p:sldId id="284" r:id="rId2"/>
+    <p:sldId id="256" r:id="rId3"/>
+    <p:sldId id="257" r:id="rId4"/>
+    <p:sldId id="258" r:id="rId5"/>
+    <p:sldId id="259" r:id="rId6"/>
+    <p:sldId id="278" r:id="rId7"/>
+    <p:sldId id="260" r:id="rId8"/>
+    <p:sldId id="261" r:id="rId9"/>
+    <p:sldId id="263" r:id="rId10"/>
+    <p:sldId id="264" r:id="rId11"/>
+    <p:sldId id="265" r:id="rId12"/>
+    <p:sldId id="266" r:id="rId13"/>
+    <p:sldId id="267" r:id="rId14"/>
+    <p:sldId id="268" r:id="rId15"/>
+    <p:sldId id="269" r:id="rId16"/>
+    <p:sldId id="270" r:id="rId17"/>
+    <p:sldId id="277" r:id="rId18"/>
+    <p:sldId id="271" r:id="rId19"/>
+    <p:sldId id="282" r:id="rId20"/>
+    <p:sldId id="272" r:id="rId21"/>
+    <p:sldId id="273" r:id="rId22"/>
+    <p:sldId id="274" r:id="rId23"/>
+    <p:sldId id="283" r:id="rId24"/>
+    <p:sldId id="276" r:id="rId25"/>
+    <p:sldId id="279" r:id="rId26"/>
+    <p:sldId id="280" r:id="rId27"/>
+    <p:sldId id="281" r:id="rId28"/>
+    <p:sldId id="285" r:id="rId29"/>
   </p:sldIdLst>
   <p:sldSz cx="9144000" cy="5143500" type="screen16x9"/>
   <p:notesSz cx="6858000" cy="9144000"/>
@@ -514,11 +516,11 @@
 </file>
 
 <file path=ppt/notesSlides/notesSlide1.xml><?xml version="1.0" encoding="utf-8"?>
-<p:notes xmlns:a="http://schemas.openxmlformats.org/drawingml/2006/main" xmlns:r="http://schemas.openxmlformats.org/officeDocument/2006/relationships" xmlns:p="http://schemas.openxmlformats.org/presentationml/2006/main" showMasterSp="0" showMasterPhAnim="0">
+<p:notes xmlns:a="http://schemas.openxmlformats.org/drawingml/2006/main" xmlns:r="http://schemas.openxmlformats.org/officeDocument/2006/relationships" xmlns:p="http://schemas.openxmlformats.org/presentationml/2006/main">
   <p:cSld>
     <p:spTree>
       <p:nvGrpSpPr>
-        <p:cNvPr id="1" name="Shape 32"/>
+        <p:cNvPr id="1" name=""/>
         <p:cNvGrpSpPr/>
         <p:nvPr/>
       </p:nvGrpSpPr>
@@ -532,7 +534,100 @@
       </p:grpSpPr>
       <p:sp>
         <p:nvSpPr>
-          <p:cNvPr id="33" name="Shape 33"/>
+          <p:cNvPr id="2" name="Slide Image Placeholder 1"/>
+          <p:cNvSpPr>
+            <a:spLocks noGrp="1" noRot="1" noChangeAspect="1"/>
+          </p:cNvSpPr>
+          <p:nvPr>
+            <p:ph type="sldImg"/>
+          </p:nvPr>
+        </p:nvSpPr>
+        <p:spPr/>
+      </p:sp>
+      <p:sp>
+        <p:nvSpPr>
+          <p:cNvPr id="3" name="Notes Placeholder 2"/>
+          <p:cNvSpPr>
+            <a:spLocks noGrp="1"/>
+          </p:cNvSpPr>
+          <p:nvPr>
+            <p:ph type="body" idx="1"/>
+          </p:nvPr>
+        </p:nvSpPr>
+        <p:spPr/>
+        <p:txBody>
+          <a:bodyPr/>
+          <a:lstStyle/>
+          <a:p>
+            <a:endParaRPr lang="en-US" dirty="0"/>
+          </a:p>
+        </p:txBody>
+      </p:sp>
+      <p:sp>
+        <p:nvSpPr>
+          <p:cNvPr id="4" name="Slide Number Placeholder 3"/>
+          <p:cNvSpPr>
+            <a:spLocks noGrp="1"/>
+          </p:cNvSpPr>
+          <p:nvPr>
+            <p:ph type="sldNum" sz="quarter" idx="10"/>
+          </p:nvPr>
+        </p:nvSpPr>
+        <p:spPr>
+          <a:xfrm>
+            <a:off x="3884613" y="8685213"/>
+            <a:ext cx="2971800" cy="457200"/>
+          </a:xfrm>
+          <a:prstGeom prst="rect">
+            <a:avLst/>
+          </a:prstGeom>
+        </p:spPr>
+        <p:txBody>
+          <a:bodyPr/>
+          <a:lstStyle/>
+          <a:p>
+            <a:fld id="{CA5D3BF3-D352-46FC-8343-31F56E6730EA}" type="slidenum">
+              <a:rPr lang="en-US" smtClean="0"/>
+              <a:pPr/>
+              <a:t>1</a:t>
+            </a:fld>
+            <a:endParaRPr lang="en-US"/>
+          </a:p>
+        </p:txBody>
+      </p:sp>
+    </p:spTree>
+    <p:extLst>
+      <p:ext uri="{BB962C8B-B14F-4D97-AF65-F5344CB8AC3E}">
+        <p14:creationId xmlns:p14="http://schemas.microsoft.com/office/powerpoint/2010/main" val="2412391530"/>
+      </p:ext>
+    </p:extLst>
+  </p:cSld>
+  <p:clrMapOvr>
+    <a:masterClrMapping/>
+  </p:clrMapOvr>
+</p:notes>
+</file>
+
+<file path=ppt/notesSlides/notesSlide10.xml><?xml version="1.0" encoding="utf-8"?>
+<p:notes xmlns:a="http://schemas.openxmlformats.org/drawingml/2006/main" xmlns:r="http://schemas.openxmlformats.org/officeDocument/2006/relationships" xmlns:p="http://schemas.openxmlformats.org/presentationml/2006/main" showMasterSp="0" showMasterPhAnim="0">
+  <p:cSld>
+    <p:spTree>
+      <p:nvGrpSpPr>
+        <p:cNvPr id="1" name="Shape 86"/>
+        <p:cNvGrpSpPr/>
+        <p:nvPr/>
+      </p:nvGrpSpPr>
+      <p:grpSpPr>
+        <a:xfrm>
+          <a:off x="0" y="0"/>
+          <a:ext cx="0" cy="0"/>
+          <a:chOff x="0" y="0"/>
+          <a:chExt cx="0" cy="0"/>
+        </a:xfrm>
+      </p:grpSpPr>
+      <p:sp>
+        <p:nvSpPr>
+          <p:cNvPr id="87" name="Shape 87"/>
           <p:cNvSpPr>
             <a:spLocks noGrp="1" noRot="1" noChangeAspect="1"/>
           </p:cNvSpPr>
@@ -542,8 +637,8 @@
         </p:nvSpPr>
         <p:spPr>
           <a:xfrm>
-            <a:off x="381000" y="685800"/>
-            <a:ext cx="6096000" cy="3429000"/>
+            <a:off x="381187" y="685800"/>
+            <a:ext cx="6096299" cy="3429000"/>
           </a:xfrm>
           <a:custGeom>
             <a:avLst/>
@@ -583,7 +678,7 @@
       </p:sp>
       <p:sp>
         <p:nvSpPr>
-          <p:cNvPr id="34" name="Shape 34"/>
+          <p:cNvPr id="88" name="Shape 88"/>
           <p:cNvSpPr txBox="1">
             <a:spLocks noGrp="1"/>
           </p:cNvSpPr>
@@ -612,7 +707,7 @@
               </a:spcBef>
               <a:buNone/>
             </a:pPr>
-            <a:endParaRPr dirty="0"/>
+            <a:endParaRPr/>
           </a:p>
         </p:txBody>
       </p:sp>
@@ -624,7 +719,7 @@
 </p:notes>
 </file>
 
-<file path=ppt/notesSlides/notesSlide10.xml><?xml version="1.0" encoding="utf-8"?>
+<file path=ppt/notesSlides/notesSlide11.xml><?xml version="1.0" encoding="utf-8"?>
 <p:notes xmlns:a="http://schemas.openxmlformats.org/drawingml/2006/main" xmlns:r="http://schemas.openxmlformats.org/officeDocument/2006/relationships" xmlns:p="http://schemas.openxmlformats.org/presentationml/2006/main" showMasterSp="0" showMasterPhAnim="0">
   <p:cSld>
     <p:spTree>
@@ -735,7 +830,7 @@
 </p:notes>
 </file>
 
-<file path=ppt/notesSlides/notesSlide11.xml><?xml version="1.0" encoding="utf-8"?>
+<file path=ppt/notesSlides/notesSlide12.xml><?xml version="1.0" encoding="utf-8"?>
 <p:notes xmlns:a="http://schemas.openxmlformats.org/drawingml/2006/main" xmlns:r="http://schemas.openxmlformats.org/officeDocument/2006/relationships" xmlns:p="http://schemas.openxmlformats.org/presentationml/2006/main" showMasterSp="0" showMasterPhAnim="0">
   <p:cSld>
     <p:spTree>
@@ -846,7 +941,7 @@
 </p:notes>
 </file>
 
-<file path=ppt/notesSlides/notesSlide12.xml><?xml version="1.0" encoding="utf-8"?>
+<file path=ppt/notesSlides/notesSlide13.xml><?xml version="1.0" encoding="utf-8"?>
 <p:notes xmlns:a="http://schemas.openxmlformats.org/drawingml/2006/main" xmlns:r="http://schemas.openxmlformats.org/officeDocument/2006/relationships" xmlns:p="http://schemas.openxmlformats.org/presentationml/2006/main" showMasterSp="0" showMasterPhAnim="0">
   <p:cSld>
     <p:spTree>
@@ -960,7 +1055,7 @@
 </p:notes>
 </file>
 
-<file path=ppt/notesSlides/notesSlide13.xml><?xml version="1.0" encoding="utf-8"?>
+<file path=ppt/notesSlides/notesSlide14.xml><?xml version="1.0" encoding="utf-8"?>
 <p:notes xmlns:a="http://schemas.openxmlformats.org/drawingml/2006/main" xmlns:r="http://schemas.openxmlformats.org/officeDocument/2006/relationships" xmlns:p="http://schemas.openxmlformats.org/presentationml/2006/main" showMasterSp="0" showMasterPhAnim="0">
   <p:cSld>
     <p:spTree>
@@ -1095,7 +1190,7 @@
 </p:notes>
 </file>
 
-<file path=ppt/notesSlides/notesSlide14.xml><?xml version="1.0" encoding="utf-8"?>
+<file path=ppt/notesSlides/notesSlide15.xml><?xml version="1.0" encoding="utf-8"?>
 <p:notes xmlns:a="http://schemas.openxmlformats.org/drawingml/2006/main" xmlns:r="http://schemas.openxmlformats.org/officeDocument/2006/relationships" xmlns:p="http://schemas.openxmlformats.org/presentationml/2006/main" showMasterSp="0" showMasterPhAnim="0">
   <p:cSld>
     <p:spTree>
@@ -1124,8 +1219,8 @@
         </p:nvSpPr>
         <p:spPr>
           <a:xfrm>
-            <a:off x="381187" y="685800"/>
-            <a:ext cx="6096299" cy="3429000"/>
+            <a:off x="381000" y="685800"/>
+            <a:ext cx="6096000" cy="3429000"/>
           </a:xfrm>
           <a:custGeom>
             <a:avLst/>
@@ -1251,7 +1346,7 @@
 </p:notes>
 </file>
 
-<file path=ppt/notesSlides/notesSlide15.xml><?xml version="1.0" encoding="utf-8"?>
+<file path=ppt/notesSlides/notesSlide16.xml><?xml version="1.0" encoding="utf-8"?>
 <p:notes xmlns:a="http://schemas.openxmlformats.org/drawingml/2006/main" xmlns:r="http://schemas.openxmlformats.org/officeDocument/2006/relationships" xmlns:p="http://schemas.openxmlformats.org/presentationml/2006/main" showMasterSp="0" showMasterPhAnim="0">
   <p:cSld>
     <p:spTree>
@@ -1365,7 +1460,7 @@
 </p:notes>
 </file>
 
-<file path=ppt/notesSlides/notesSlide16.xml><?xml version="1.0" encoding="utf-8"?>
+<file path=ppt/notesSlides/notesSlide17.xml><?xml version="1.0" encoding="utf-8"?>
 <p:notes xmlns:a="http://schemas.openxmlformats.org/drawingml/2006/main" xmlns:r="http://schemas.openxmlformats.org/officeDocument/2006/relationships" xmlns:p="http://schemas.openxmlformats.org/presentationml/2006/main" showMasterSp="0" showMasterPhAnim="0">
   <p:cSld>
     <p:spTree>
@@ -1569,7 +1664,7 @@
 </p:notes>
 </file>
 
-<file path=ppt/notesSlides/notesSlide17.xml><?xml version="1.0" encoding="utf-8"?>
+<file path=ppt/notesSlides/notesSlide18.xml><?xml version="1.0" encoding="utf-8"?>
 <p:notes xmlns:a="http://schemas.openxmlformats.org/drawingml/2006/main" xmlns:r="http://schemas.openxmlformats.org/officeDocument/2006/relationships" xmlns:p="http://schemas.openxmlformats.org/presentationml/2006/main">
   <p:cSld>
     <p:spTree>
@@ -1668,7 +1763,7 @@
 </p:notes>
 </file>
 
-<file path=ppt/notesSlides/notesSlide18.xml><?xml version="1.0" encoding="utf-8"?>
+<file path=ppt/notesSlides/notesSlide19.xml><?xml version="1.0" encoding="utf-8"?>
 <p:notes xmlns:a="http://schemas.openxmlformats.org/drawingml/2006/main" xmlns:r="http://schemas.openxmlformats.org/officeDocument/2006/relationships" xmlns:p="http://schemas.openxmlformats.org/presentationml/2006/main" showMasterSp="0" showMasterPhAnim="0">
   <p:cSld>
     <p:spTree>
@@ -1839,12 +1934,12 @@
 </p:notes>
 </file>
 
-<file path=ppt/notesSlides/notesSlide19.xml><?xml version="1.0" encoding="utf-8"?>
+<file path=ppt/notesSlides/notesSlide2.xml><?xml version="1.0" encoding="utf-8"?>
 <p:notes xmlns:a="http://schemas.openxmlformats.org/drawingml/2006/main" xmlns:r="http://schemas.openxmlformats.org/officeDocument/2006/relationships" xmlns:p="http://schemas.openxmlformats.org/presentationml/2006/main" showMasterSp="0" showMasterPhAnim="0">
   <p:cSld>
     <p:spTree>
       <p:nvGrpSpPr>
-        <p:cNvPr id="1" name="Shape 143"/>
+        <p:cNvPr id="1" name="Shape 32"/>
         <p:cNvGrpSpPr/>
         <p:nvPr/>
       </p:nvGrpSpPr>
@@ -1858,7 +1953,7 @@
       </p:grpSpPr>
       <p:sp>
         <p:nvSpPr>
-          <p:cNvPr id="144" name="Shape 144"/>
+          <p:cNvPr id="33" name="Shape 33"/>
           <p:cNvSpPr>
             <a:spLocks noGrp="1" noRot="1" noChangeAspect="1"/>
           </p:cNvSpPr>
@@ -1868,8 +1963,8 @@
         </p:nvSpPr>
         <p:spPr>
           <a:xfrm>
-            <a:off x="381187" y="685800"/>
-            <a:ext cx="6096299" cy="3429000"/>
+            <a:off x="381000" y="685800"/>
+            <a:ext cx="6096000" cy="3429000"/>
           </a:xfrm>
           <a:custGeom>
             <a:avLst/>
@@ -1909,7 +2004,7 @@
       </p:sp>
       <p:sp>
         <p:nvSpPr>
-          <p:cNvPr id="145" name="Shape 145"/>
+          <p:cNvPr id="34" name="Shape 34"/>
           <p:cNvSpPr txBox="1">
             <a:spLocks noGrp="1"/>
           </p:cNvSpPr>
@@ -1932,81 +2027,13 @@
           </a:bodyPr>
           <a:lstStyle/>
           <a:p>
-            <a:pPr rtl="0">
-              <a:spcBef>
-                <a:spcPts val="0"/>
-              </a:spcBef>
-              <a:buNone/>
-            </a:pPr>
-            <a:r>
-              <a:rPr lang="en" dirty="0">
-                <a:solidFill>
-                  <a:schemeClr val="dk1"/>
-                </a:solidFill>
-              </a:rPr>
-              <a:t>Here we have an async event handler calling an async method that returns an integer.</a:t>
-            </a:r>
-          </a:p>
-          <a:p>
-            <a:pPr rtl="0">
-              <a:spcBef>
-                <a:spcPts val="0"/>
-              </a:spcBef>
-              <a:buNone/>
-            </a:pPr>
-            <a:endParaRPr dirty="0">
-              <a:solidFill>
-                <a:schemeClr val="dk1"/>
-              </a:solidFill>
-            </a:endParaRPr>
-          </a:p>
-          <a:p>
-            <a:pPr rtl="0">
-              <a:spcBef>
-                <a:spcPts val="0"/>
-              </a:spcBef>
-              <a:buNone/>
-            </a:pPr>
-            <a:r>
-              <a:rPr lang="en" dirty="0">
-                <a:solidFill>
-                  <a:schemeClr val="dk1"/>
-                </a:solidFill>
-              </a:rPr>
-              <a:t>Again, we set the event handler to be async because it uses the await keyword</a:t>
-            </a:r>
-          </a:p>
-          <a:p>
-            <a:pPr rtl="0">
-              <a:spcBef>
-                <a:spcPts val="0"/>
-              </a:spcBef>
-              <a:buNone/>
-            </a:pPr>
-            <a:r>
-              <a:rPr lang="en" dirty="0">
-                <a:solidFill>
-                  <a:schemeClr val="dk1"/>
-                </a:solidFill>
-              </a:rPr>
-              <a:t>Notice that CountToMaxValueAsync ends with Async, this is supposed to tell the person who uses your API that this method is supposed to be used Asynchronously</a:t>
-            </a:r>
-          </a:p>
-          <a:p>
             <a:pPr>
               <a:spcBef>
                 <a:spcPts val="0"/>
               </a:spcBef>
               <a:buNone/>
             </a:pPr>
-            <a:r>
-              <a:rPr lang="en" dirty="0">
-                <a:solidFill>
-                  <a:schemeClr val="dk1"/>
-                </a:solidFill>
-              </a:rPr>
-              <a:t>Notice we use return Task&lt;int&gt; as opposed to Task like last time, this indicates the return value of the async method is an int</a:t>
-            </a:r>
+            <a:endParaRPr dirty="0"/>
           </a:p>
         </p:txBody>
       </p:sp>
@@ -2018,12 +2045,12 @@
 </p:notes>
 </file>
 
-<file path=ppt/notesSlides/notesSlide2.xml><?xml version="1.0" encoding="utf-8"?>
+<file path=ppt/notesSlides/notesSlide20.xml><?xml version="1.0" encoding="utf-8"?>
 <p:notes xmlns:a="http://schemas.openxmlformats.org/drawingml/2006/main" xmlns:r="http://schemas.openxmlformats.org/officeDocument/2006/relationships" xmlns:p="http://schemas.openxmlformats.org/presentationml/2006/main" showMasterSp="0" showMasterPhAnim="0">
   <p:cSld>
     <p:spTree>
       <p:nvGrpSpPr>
-        <p:cNvPr id="1" name="Shape 38"/>
+        <p:cNvPr id="1" name="Shape 143"/>
         <p:cNvGrpSpPr/>
         <p:nvPr/>
       </p:nvGrpSpPr>
@@ -2037,7 +2064,7 @@
       </p:grpSpPr>
       <p:sp>
         <p:nvSpPr>
-          <p:cNvPr id="39" name="Shape 39"/>
+          <p:cNvPr id="144" name="Shape 144"/>
           <p:cNvSpPr>
             <a:spLocks noGrp="1" noRot="1" noChangeAspect="1"/>
           </p:cNvSpPr>
@@ -2047,8 +2074,8 @@
         </p:nvSpPr>
         <p:spPr>
           <a:xfrm>
-            <a:off x="381000" y="685800"/>
-            <a:ext cx="6096000" cy="3429000"/>
+            <a:off x="381187" y="685800"/>
+            <a:ext cx="6096299" cy="3429000"/>
           </a:xfrm>
           <a:custGeom>
             <a:avLst/>
@@ -2088,7 +2115,7 @@
       </p:sp>
       <p:sp>
         <p:nvSpPr>
-          <p:cNvPr id="40" name="Shape 40"/>
+          <p:cNvPr id="145" name="Shape 145"/>
           <p:cNvSpPr txBox="1">
             <a:spLocks noGrp="1"/>
           </p:cNvSpPr>
@@ -2111,13 +2138,81 @@
           </a:bodyPr>
           <a:lstStyle/>
           <a:p>
+            <a:pPr rtl="0">
+              <a:spcBef>
+                <a:spcPts val="0"/>
+              </a:spcBef>
+              <a:buNone/>
+            </a:pPr>
+            <a:r>
+              <a:rPr lang="en" dirty="0">
+                <a:solidFill>
+                  <a:schemeClr val="dk1"/>
+                </a:solidFill>
+              </a:rPr>
+              <a:t>Here we have an async event handler calling an async method that returns an integer.</a:t>
+            </a:r>
+          </a:p>
+          <a:p>
+            <a:pPr rtl="0">
+              <a:spcBef>
+                <a:spcPts val="0"/>
+              </a:spcBef>
+              <a:buNone/>
+            </a:pPr>
+            <a:endParaRPr dirty="0">
+              <a:solidFill>
+                <a:schemeClr val="dk1"/>
+              </a:solidFill>
+            </a:endParaRPr>
+          </a:p>
+          <a:p>
+            <a:pPr rtl="0">
+              <a:spcBef>
+                <a:spcPts val="0"/>
+              </a:spcBef>
+              <a:buNone/>
+            </a:pPr>
+            <a:r>
+              <a:rPr lang="en" dirty="0">
+                <a:solidFill>
+                  <a:schemeClr val="dk1"/>
+                </a:solidFill>
+              </a:rPr>
+              <a:t>Again, we set the event handler to be async because it uses the await keyword</a:t>
+            </a:r>
+          </a:p>
+          <a:p>
+            <a:pPr rtl="0">
+              <a:spcBef>
+                <a:spcPts val="0"/>
+              </a:spcBef>
+              <a:buNone/>
+            </a:pPr>
+            <a:r>
+              <a:rPr lang="en" dirty="0">
+                <a:solidFill>
+                  <a:schemeClr val="dk1"/>
+                </a:solidFill>
+              </a:rPr>
+              <a:t>Notice that CountToMaxValueAsync ends with Async, this is supposed to tell the person who uses your API that this method is supposed to be used Asynchronously</a:t>
+            </a:r>
+          </a:p>
+          <a:p>
             <a:pPr>
               <a:spcBef>
                 <a:spcPts val="0"/>
               </a:spcBef>
               <a:buNone/>
             </a:pPr>
-            <a:endParaRPr/>
+            <a:r>
+              <a:rPr lang="en" dirty="0">
+                <a:solidFill>
+                  <a:schemeClr val="dk1"/>
+                </a:solidFill>
+              </a:rPr>
+              <a:t>Notice we use return Task&lt;int&gt; as opposed to Task like last time, this indicates the return value of the async method is an int</a:t>
+            </a:r>
           </a:p>
         </p:txBody>
       </p:sp>
@@ -2129,7 +2224,7 @@
 </p:notes>
 </file>
 
-<file path=ppt/notesSlides/notesSlide20.xml><?xml version="1.0" encoding="utf-8"?>
+<file path=ppt/notesSlides/notesSlide21.xml><?xml version="1.0" encoding="utf-8"?>
 <p:notes xmlns:a="http://schemas.openxmlformats.org/drawingml/2006/main" xmlns:r="http://schemas.openxmlformats.org/officeDocument/2006/relationships" xmlns:p="http://schemas.openxmlformats.org/presentationml/2006/main" showMasterSp="0" showMasterPhAnim="0">
   <p:cSld>
     <p:spTree>
@@ -2322,7 +2417,7 @@
 </p:notes>
 </file>
 
-<file path=ppt/notesSlides/notesSlide21.xml><?xml version="1.0" encoding="utf-8"?>
+<file path=ppt/notesSlides/notesSlide22.xml><?xml version="1.0" encoding="utf-8"?>
 <p:notes xmlns:a="http://schemas.openxmlformats.org/drawingml/2006/main" xmlns:r="http://schemas.openxmlformats.org/officeDocument/2006/relationships" xmlns:p="http://schemas.openxmlformats.org/presentationml/2006/main">
   <p:cSld>
     <p:spTree>
@@ -2450,7 +2545,7 @@
 </p:notes>
 </file>
 
-<file path=ppt/notesSlides/notesSlide22.xml><?xml version="1.0" encoding="utf-8"?>
+<file path=ppt/notesSlides/notesSlide23.xml><?xml version="1.0" encoding="utf-8"?>
 <p:notes xmlns:a="http://schemas.openxmlformats.org/drawingml/2006/main" xmlns:r="http://schemas.openxmlformats.org/officeDocument/2006/relationships" xmlns:p="http://schemas.openxmlformats.org/presentationml/2006/main" showMasterSp="0" showMasterPhAnim="0">
   <p:cSld>
     <p:spTree>
@@ -2561,12 +2656,12 @@
 </p:notes>
 </file>
 
-<file path=ppt/notesSlides/notesSlide3.xml><?xml version="1.0" encoding="utf-8"?>
-<p:notes xmlns:a="http://schemas.openxmlformats.org/drawingml/2006/main" xmlns:r="http://schemas.openxmlformats.org/officeDocument/2006/relationships" xmlns:p="http://schemas.openxmlformats.org/presentationml/2006/main" showMasterSp="0" showMasterPhAnim="0">
+<file path=ppt/notesSlides/notesSlide24.xml><?xml version="1.0" encoding="utf-8"?>
+<p:notes xmlns:a="http://schemas.openxmlformats.org/drawingml/2006/main" xmlns:r="http://schemas.openxmlformats.org/officeDocument/2006/relationships" xmlns:p="http://schemas.openxmlformats.org/presentationml/2006/main">
   <p:cSld>
     <p:spTree>
       <p:nvGrpSpPr>
-        <p:cNvPr id="1" name="Shape 44"/>
+        <p:cNvPr id="1" name=""/>
         <p:cNvGrpSpPr/>
         <p:nvPr/>
       </p:nvGrpSpPr>
@@ -2580,7 +2675,100 @@
       </p:grpSpPr>
       <p:sp>
         <p:nvSpPr>
-          <p:cNvPr id="45" name="Shape 45"/>
+          <p:cNvPr id="2" name="Slide Image Placeholder 1"/>
+          <p:cNvSpPr>
+            <a:spLocks noGrp="1" noRot="1" noChangeAspect="1"/>
+          </p:cNvSpPr>
+          <p:nvPr>
+            <p:ph type="sldImg"/>
+          </p:nvPr>
+        </p:nvSpPr>
+        <p:spPr/>
+      </p:sp>
+      <p:sp>
+        <p:nvSpPr>
+          <p:cNvPr id="3" name="Notes Placeholder 2"/>
+          <p:cNvSpPr>
+            <a:spLocks noGrp="1"/>
+          </p:cNvSpPr>
+          <p:nvPr>
+            <p:ph type="body" idx="1"/>
+          </p:nvPr>
+        </p:nvSpPr>
+        <p:spPr/>
+        <p:txBody>
+          <a:bodyPr/>
+          <a:lstStyle/>
+          <a:p>
+            <a:endParaRPr lang="en-US" dirty="0"/>
+          </a:p>
+        </p:txBody>
+      </p:sp>
+      <p:sp>
+        <p:nvSpPr>
+          <p:cNvPr id="4" name="Slide Number Placeholder 3"/>
+          <p:cNvSpPr>
+            <a:spLocks noGrp="1"/>
+          </p:cNvSpPr>
+          <p:nvPr>
+            <p:ph type="sldNum" sz="quarter" idx="10"/>
+          </p:nvPr>
+        </p:nvSpPr>
+        <p:spPr>
+          <a:xfrm>
+            <a:off x="3884613" y="8685213"/>
+            <a:ext cx="2971800" cy="457200"/>
+          </a:xfrm>
+          <a:prstGeom prst="rect">
+            <a:avLst/>
+          </a:prstGeom>
+        </p:spPr>
+        <p:txBody>
+          <a:bodyPr/>
+          <a:lstStyle/>
+          <a:p>
+            <a:fld id="{CA5D3BF3-D352-46FC-8343-31F56E6730EA}" type="slidenum">
+              <a:rPr lang="en-US" smtClean="0"/>
+              <a:pPr/>
+              <a:t>28</a:t>
+            </a:fld>
+            <a:endParaRPr lang="en-US"/>
+          </a:p>
+        </p:txBody>
+      </p:sp>
+    </p:spTree>
+    <p:extLst>
+      <p:ext uri="{BB962C8B-B14F-4D97-AF65-F5344CB8AC3E}">
+        <p14:creationId xmlns:p14="http://schemas.microsoft.com/office/powerpoint/2010/main" val="2412391530"/>
+      </p:ext>
+    </p:extLst>
+  </p:cSld>
+  <p:clrMapOvr>
+    <a:masterClrMapping/>
+  </p:clrMapOvr>
+</p:notes>
+</file>
+
+<file path=ppt/notesSlides/notesSlide3.xml><?xml version="1.0" encoding="utf-8"?>
+<p:notes xmlns:a="http://schemas.openxmlformats.org/drawingml/2006/main" xmlns:r="http://schemas.openxmlformats.org/officeDocument/2006/relationships" xmlns:p="http://schemas.openxmlformats.org/presentationml/2006/main" showMasterSp="0" showMasterPhAnim="0">
+  <p:cSld>
+    <p:spTree>
+      <p:nvGrpSpPr>
+        <p:cNvPr id="1" name="Shape 38"/>
+        <p:cNvGrpSpPr/>
+        <p:nvPr/>
+      </p:nvGrpSpPr>
+      <p:grpSpPr>
+        <a:xfrm>
+          <a:off x="0" y="0"/>
+          <a:ext cx="0" cy="0"/>
+          <a:chOff x="0" y="0"/>
+          <a:chExt cx="0" cy="0"/>
+        </a:xfrm>
+      </p:grpSpPr>
+      <p:sp>
+        <p:nvSpPr>
+          <p:cNvPr id="39" name="Shape 39"/>
           <p:cNvSpPr>
             <a:spLocks noGrp="1" noRot="1" noChangeAspect="1"/>
           </p:cNvSpPr>
@@ -2631,7 +2819,7 @@
       </p:sp>
       <p:sp>
         <p:nvSpPr>
-          <p:cNvPr id="46" name="Shape 46"/>
+          <p:cNvPr id="40" name="Shape 40"/>
           <p:cNvSpPr txBox="1">
             <a:spLocks noGrp="1"/>
           </p:cNvSpPr>
@@ -2677,7 +2865,7 @@
   <p:cSld>
     <p:spTree>
       <p:nvGrpSpPr>
-        <p:cNvPr id="1" name="Shape 50"/>
+        <p:cNvPr id="1" name="Shape 44"/>
         <p:cNvGrpSpPr/>
         <p:nvPr/>
       </p:nvGrpSpPr>
@@ -2691,7 +2879,7 @@
       </p:grpSpPr>
       <p:sp>
         <p:nvSpPr>
-          <p:cNvPr id="51" name="Shape 51"/>
+          <p:cNvPr id="45" name="Shape 45"/>
           <p:cNvSpPr>
             <a:spLocks noGrp="1" noRot="1" noChangeAspect="1"/>
           </p:cNvSpPr>
@@ -2742,7 +2930,7 @@
       </p:sp>
       <p:sp>
         <p:nvSpPr>
-          <p:cNvPr id="52" name="Shape 52"/>
+          <p:cNvPr id="46" name="Shape 46"/>
           <p:cNvSpPr txBox="1">
             <a:spLocks noGrp="1"/>
           </p:cNvSpPr>
@@ -2771,10 +2959,7 @@
               </a:spcBef>
               <a:buNone/>
             </a:pPr>
-            <a:r>
-              <a:rPr lang="en"/>
-              <a:t>I started developing software since high school, I then went onto to Conestoga College for the Software Engineering Technology course for 4 years, 16 months of which was spent at Magnet, and I’ve been working at Magnet since I graduated early last year.</a:t>
-            </a:r>
+            <a:endParaRPr/>
           </a:p>
         </p:txBody>
       </p:sp>
@@ -2787,11 +2972,11 @@
 </file>
 
 <file path=ppt/notesSlides/notesSlide5.xml><?xml version="1.0" encoding="utf-8"?>
-<p:notes xmlns:a="http://schemas.openxmlformats.org/drawingml/2006/main" xmlns:r="http://schemas.openxmlformats.org/officeDocument/2006/relationships" xmlns:p="http://schemas.openxmlformats.org/presentationml/2006/main">
+<p:notes xmlns:a="http://schemas.openxmlformats.org/drawingml/2006/main" xmlns:r="http://schemas.openxmlformats.org/officeDocument/2006/relationships" xmlns:p="http://schemas.openxmlformats.org/presentationml/2006/main" showMasterSp="0" showMasterPhAnim="0">
   <p:cSld>
     <p:spTree>
       <p:nvGrpSpPr>
-        <p:cNvPr id="1" name=""/>
+        <p:cNvPr id="1" name="Shape 50"/>
         <p:cNvGrpSpPr/>
         <p:nvPr/>
       </p:nvGrpSpPr>
@@ -2805,103 +2990,7 @@
       </p:grpSpPr>
       <p:sp>
         <p:nvSpPr>
-          <p:cNvPr id="2" name="Slide Image Placeholder 1"/>
-          <p:cNvSpPr>
-            <a:spLocks noGrp="1" noRot="1" noChangeAspect="1"/>
-          </p:cNvSpPr>
-          <p:nvPr>
-            <p:ph type="sldImg"/>
-          </p:nvPr>
-        </p:nvSpPr>
-        <p:spPr>
-          <a:xfrm>
-            <a:off x="381000" y="685800"/>
-            <a:ext cx="6096000" cy="3429000"/>
-          </a:xfrm>
-        </p:spPr>
-      </p:sp>
-      <p:sp>
-        <p:nvSpPr>
-          <p:cNvPr id="3" name="Notes Placeholder 2"/>
-          <p:cNvSpPr>
-            <a:spLocks noGrp="1"/>
-          </p:cNvSpPr>
-          <p:nvPr>
-            <p:ph type="body" idx="1"/>
-          </p:nvPr>
-        </p:nvSpPr>
-        <p:spPr/>
-        <p:txBody>
-          <a:bodyPr/>
-          <a:lstStyle/>
-          <a:p>
-            <a:r>
-              <a:rPr lang="en-CA" dirty="0" smtClean="0"/>
-              <a:t>Delegate – A block of code, the same thing</a:t>
-            </a:r>
-            <a:r>
-              <a:rPr lang="en-CA" baseline="0" dirty="0" smtClean="0"/>
-              <a:t> as a method or function</a:t>
-            </a:r>
-          </a:p>
-          <a:p>
-            <a:r>
-              <a:rPr lang="en-CA" baseline="0" dirty="0" smtClean="0"/>
-              <a:t>Starving – When you starve a thread, you don’t give it enough resources to execute</a:t>
-            </a:r>
-          </a:p>
-          <a:p>
-            <a:r>
-              <a:rPr lang="en-CA" baseline="0" dirty="0" err="1" smtClean="0"/>
-              <a:t>Threadpool</a:t>
-            </a:r>
-            <a:r>
-              <a:rPr lang="en-CA" baseline="0" dirty="0" smtClean="0"/>
-              <a:t> – A collection of threads that work asynchronously for the application </a:t>
-            </a:r>
-          </a:p>
-          <a:p>
-            <a:r>
-              <a:rPr lang="en-CA" baseline="0" dirty="0" smtClean="0"/>
-              <a:t>Tight Loop – When a thread doesn’t give up the CPU to other applications</a:t>
-            </a:r>
-            <a:endParaRPr lang="en-CA" dirty="0"/>
-          </a:p>
-        </p:txBody>
-      </p:sp>
-    </p:spTree>
-    <p:extLst>
-      <p:ext uri="{BB962C8B-B14F-4D97-AF65-F5344CB8AC3E}">
-        <p14:creationId xmlns:p14="http://schemas.microsoft.com/office/powerpoint/2010/main" val="3685791674"/>
-      </p:ext>
-    </p:extLst>
-  </p:cSld>
-  <p:clrMapOvr>
-    <a:masterClrMapping/>
-  </p:clrMapOvr>
-</p:notes>
-</file>
-
-<file path=ppt/notesSlides/notesSlide6.xml><?xml version="1.0" encoding="utf-8"?>
-<p:notes xmlns:a="http://schemas.openxmlformats.org/drawingml/2006/main" xmlns:r="http://schemas.openxmlformats.org/officeDocument/2006/relationships" xmlns:p="http://schemas.openxmlformats.org/presentationml/2006/main" showMasterSp="0" showMasterPhAnim="0">
-  <p:cSld>
-    <p:spTree>
-      <p:nvGrpSpPr>
-        <p:cNvPr id="1" name="Shape 57"/>
-        <p:cNvGrpSpPr/>
-        <p:nvPr/>
-      </p:nvGrpSpPr>
-      <p:grpSpPr>
-        <a:xfrm>
-          <a:off x="0" y="0"/>
-          <a:ext cx="0" cy="0"/>
-          <a:chOff x="0" y="0"/>
-          <a:chExt cx="0" cy="0"/>
-        </a:xfrm>
-      </p:grpSpPr>
-      <p:sp>
-        <p:nvSpPr>
-          <p:cNvPr id="58" name="Shape 58"/>
+          <p:cNvPr id="51" name="Shape 51"/>
           <p:cNvSpPr>
             <a:spLocks noGrp="1" noRot="1" noChangeAspect="1"/>
           </p:cNvSpPr>
@@ -2952,7 +3041,7 @@
       </p:sp>
       <p:sp>
         <p:nvSpPr>
-          <p:cNvPr id="59" name="Shape 59"/>
+          <p:cNvPr id="52" name="Shape 52"/>
           <p:cNvSpPr txBox="1">
             <a:spLocks noGrp="1"/>
           </p:cNvSpPr>
@@ -2975,7 +3064,7 @@
           </a:bodyPr>
           <a:lstStyle/>
           <a:p>
-            <a:pPr lvl="0" rtl="0">
+            <a:pPr>
               <a:spcBef>
                 <a:spcPts val="0"/>
               </a:spcBef>
@@ -2983,60 +3072,108 @@
             </a:pPr>
             <a:r>
               <a:rPr lang="en"/>
-              <a:t>1.Taken from MSDN</a:t>
-            </a:r>
-          </a:p>
-          <a:p>
-            <a:pPr rtl="0">
-              <a:spcBef>
-                <a:spcPts val="0"/>
-              </a:spcBef>
-              <a:buNone/>
-            </a:pPr>
-            <a:r>
-              <a:rPr lang="en"/>
-              <a:t>3.The UI thread is what allows you to interact with your application, buttons, status bars, lists, etc. while the executing thread is the thread that runs the code of your application. There are more threads than just the two, but we’ll ignore those for now.</a:t>
-            </a:r>
-          </a:p>
-          <a:p>
-            <a:pPr rtl="0">
-              <a:spcBef>
-                <a:spcPts val="0"/>
-              </a:spcBef>
-              <a:buNone/>
-            </a:pPr>
-            <a:r>
-              <a:rPr lang="en"/>
-              <a:t>4.Too many threads leads to poor resource allocation, in that each thread get such little processor time that they basically stop executing</a:t>
-            </a:r>
-          </a:p>
-          <a:p>
-            <a:pPr rtl="0">
-              <a:spcBef>
-                <a:spcPts val="0"/>
-              </a:spcBef>
-              <a:buNone/>
-            </a:pPr>
-            <a:r>
-              <a:rPr lang="en"/>
-              <a:t>5.The operating system keeps track of your threads’ information, which means you don’t have to worry about saving state when threads start and stop executing</a:t>
-            </a:r>
-          </a:p>
-          <a:p>
-            <a:pPr lvl="0" rtl="0">
-              <a:spcBef>
-                <a:spcPts val="0"/>
-              </a:spcBef>
-              <a:buNone/>
-            </a:pPr>
-            <a:r>
-              <a:rPr lang="en"/>
-              <a:t>6.These levels of importance determine how much processor time the Thread receives</a:t>
+              <a:t>I started developing software since high school, I then went onto to Conestoga College for the Software Engineering Technology course for 4 years, 16 months of which was spent at Magnet, and I’ve been working at Magnet since I graduated early last year.</a:t>
             </a:r>
           </a:p>
         </p:txBody>
       </p:sp>
     </p:spTree>
+  </p:cSld>
+  <p:clrMapOvr>
+    <a:masterClrMapping/>
+  </p:clrMapOvr>
+</p:notes>
+</file>
+
+<file path=ppt/notesSlides/notesSlide6.xml><?xml version="1.0" encoding="utf-8"?>
+<p:notes xmlns:a="http://schemas.openxmlformats.org/drawingml/2006/main" xmlns:r="http://schemas.openxmlformats.org/officeDocument/2006/relationships" xmlns:p="http://schemas.openxmlformats.org/presentationml/2006/main">
+  <p:cSld>
+    <p:spTree>
+      <p:nvGrpSpPr>
+        <p:cNvPr id="1" name=""/>
+        <p:cNvGrpSpPr/>
+        <p:nvPr/>
+      </p:nvGrpSpPr>
+      <p:grpSpPr>
+        <a:xfrm>
+          <a:off x="0" y="0"/>
+          <a:ext cx="0" cy="0"/>
+          <a:chOff x="0" y="0"/>
+          <a:chExt cx="0" cy="0"/>
+        </a:xfrm>
+      </p:grpSpPr>
+      <p:sp>
+        <p:nvSpPr>
+          <p:cNvPr id="2" name="Slide Image Placeholder 1"/>
+          <p:cNvSpPr>
+            <a:spLocks noGrp="1" noRot="1" noChangeAspect="1"/>
+          </p:cNvSpPr>
+          <p:nvPr>
+            <p:ph type="sldImg"/>
+          </p:nvPr>
+        </p:nvSpPr>
+        <p:spPr>
+          <a:xfrm>
+            <a:off x="381000" y="685800"/>
+            <a:ext cx="6096000" cy="3429000"/>
+          </a:xfrm>
+        </p:spPr>
+      </p:sp>
+      <p:sp>
+        <p:nvSpPr>
+          <p:cNvPr id="3" name="Notes Placeholder 2"/>
+          <p:cNvSpPr>
+            <a:spLocks noGrp="1"/>
+          </p:cNvSpPr>
+          <p:nvPr>
+            <p:ph type="body" idx="1"/>
+          </p:nvPr>
+        </p:nvSpPr>
+        <p:spPr/>
+        <p:txBody>
+          <a:bodyPr/>
+          <a:lstStyle/>
+          <a:p>
+            <a:r>
+              <a:rPr lang="en-CA" dirty="0" smtClean="0"/>
+              <a:t>Delegate – A block of code, the same thing</a:t>
+            </a:r>
+            <a:r>
+              <a:rPr lang="en-CA" baseline="0" dirty="0" smtClean="0"/>
+              <a:t> as a method or function</a:t>
+            </a:r>
+          </a:p>
+          <a:p>
+            <a:r>
+              <a:rPr lang="en-CA" baseline="0" dirty="0" smtClean="0"/>
+              <a:t>Starving – When you starve a thread, you don’t give it enough resources to execute</a:t>
+            </a:r>
+          </a:p>
+          <a:p>
+            <a:r>
+              <a:rPr lang="en-CA" baseline="0" dirty="0" err="1" smtClean="0"/>
+              <a:t>Threadpool</a:t>
+            </a:r>
+            <a:r>
+              <a:rPr lang="en-CA" baseline="0" dirty="0" smtClean="0"/>
+              <a:t> – A collection of threads that work asynchronously for the application </a:t>
+            </a:r>
+          </a:p>
+          <a:p>
+            <a:r>
+              <a:rPr lang="en-CA" baseline="0" dirty="0" smtClean="0"/>
+              <a:t>Tight Loop – When a thread doesn’t give up the CPU to other applications</a:t>
+            </a:r>
+            <a:endParaRPr lang="en-CA" dirty="0"/>
+          </a:p>
+        </p:txBody>
+      </p:sp>
+    </p:spTree>
+    <p:extLst>
+      <p:ext uri="{BB962C8B-B14F-4D97-AF65-F5344CB8AC3E}">
+        <p14:creationId xmlns:p14="http://schemas.microsoft.com/office/powerpoint/2010/main" val="3685791674"/>
+      </p:ext>
+    </p:extLst>
   </p:cSld>
   <p:clrMapOvr>
     <a:masterClrMapping/>
@@ -3049,7 +3186,7 @@
   <p:cSld>
     <p:spTree>
       <p:nvGrpSpPr>
-        <p:cNvPr id="1" name="Shape 62"/>
+        <p:cNvPr id="1" name="Shape 57"/>
         <p:cNvGrpSpPr/>
         <p:nvPr/>
       </p:nvGrpSpPr>
@@ -3063,7 +3200,7 @@
       </p:grpSpPr>
       <p:sp>
         <p:nvSpPr>
-          <p:cNvPr id="63" name="Shape 63"/>
+          <p:cNvPr id="58" name="Shape 58"/>
           <p:cNvSpPr>
             <a:spLocks noGrp="1" noRot="1" noChangeAspect="1"/>
           </p:cNvSpPr>
@@ -3073,8 +3210,8 @@
         </p:nvSpPr>
         <p:spPr>
           <a:xfrm>
-            <a:off x="381187" y="685800"/>
-            <a:ext cx="6096299" cy="3429000"/>
+            <a:off x="381000" y="685800"/>
+            <a:ext cx="6096000" cy="3429000"/>
           </a:xfrm>
           <a:custGeom>
             <a:avLst/>
@@ -3114,7 +3251,7 @@
       </p:sp>
       <p:sp>
         <p:nvSpPr>
-          <p:cNvPr id="64" name="Shape 64"/>
+          <p:cNvPr id="59" name="Shape 59"/>
           <p:cNvSpPr txBox="1">
             <a:spLocks noGrp="1"/>
           </p:cNvSpPr>
@@ -3137,6 +3274,18 @@
           </a:bodyPr>
           <a:lstStyle/>
           <a:p>
+            <a:pPr lvl="0" rtl="0">
+              <a:spcBef>
+                <a:spcPts val="0"/>
+              </a:spcBef>
+              <a:buNone/>
+            </a:pPr>
+            <a:r>
+              <a:rPr lang="en"/>
+              <a:t>1.Taken from MSDN</a:t>
+            </a:r>
+          </a:p>
+          <a:p>
             <a:pPr rtl="0">
               <a:spcBef>
                 <a:spcPts val="0"/>
@@ -3145,7 +3294,7 @@
             </a:pPr>
             <a:r>
               <a:rPr lang="en"/>
-              <a:t>From 0 to 10 milliseconds Threads 1 and 2 get time on the processor.</a:t>
+              <a:t>3.The UI thread is what allows you to interact with your application, buttons, status bars, lists, etc. while the executing thread is the thread that runs the code of your application. There are more threads than just the two, but we’ll ignore those for now.</a:t>
             </a:r>
           </a:p>
           <a:p>
@@ -3157,7 +3306,7 @@
             </a:pPr>
             <a:r>
               <a:rPr lang="en"/>
-              <a:t>From 10 to 20 milliseconds Threads 3 and 4 get time on the processor.</a:t>
+              <a:t>4.Too many threads leads to poor resource allocation, in that each thread get such little processor time that they basically stop executing</a:t>
             </a:r>
           </a:p>
           <a:p>
@@ -3167,31 +3316,13 @@
               </a:spcBef>
               <a:buNone/>
             </a:pPr>
-            <a:endParaRPr/>
-          </a:p>
-          <a:p>
-            <a:pPr rtl="0">
-              <a:spcBef>
-                <a:spcPts val="0"/>
-              </a:spcBef>
-              <a:buNone/>
-            </a:pPr>
             <a:r>
               <a:rPr lang="en"/>
-              <a:t>This means each thread has the same level of importance.</a:t>
-            </a:r>
-          </a:p>
-          <a:p>
-            <a:pPr rtl="0">
-              <a:spcBef>
-                <a:spcPts val="0"/>
-              </a:spcBef>
-              <a:buNone/>
-            </a:pPr>
-            <a:endParaRPr/>
-          </a:p>
-          <a:p>
-            <a:pPr rtl="0">
+              <a:t>5.The operating system keeps track of your threads’ information, which means you don’t have to worry about saving state when threads start and stop executing</a:t>
+            </a:r>
+          </a:p>
+          <a:p>
+            <a:pPr lvl="0" rtl="0">
               <a:spcBef>
                 <a:spcPts val="0"/>
               </a:spcBef>
@@ -3199,131 +3330,7 @@
             </a:pPr>
             <a:r>
               <a:rPr lang="en"/>
-              <a:t>From 20 to 30 milliseconds Threads 3 and 1 get time on the processor .</a:t>
-            </a:r>
-          </a:p>
-          <a:p>
-            <a:pPr rtl="0">
-              <a:spcBef>
-                <a:spcPts val="0"/>
-              </a:spcBef>
-              <a:buNone/>
-            </a:pPr>
-            <a:r>
-              <a:rPr lang="en"/>
-              <a:t>From 30 to 40 milliseconds Threads 3 and 2 get time on the processor.</a:t>
-            </a:r>
-          </a:p>
-          <a:p>
-            <a:pPr rtl="0">
-              <a:spcBef>
-                <a:spcPts val="0"/>
-              </a:spcBef>
-              <a:buNone/>
-            </a:pPr>
-            <a:endParaRPr/>
-          </a:p>
-          <a:p>
-            <a:pPr rtl="0">
-              <a:spcBef>
-                <a:spcPts val="0"/>
-              </a:spcBef>
-              <a:buNone/>
-            </a:pPr>
-            <a:r>
-              <a:rPr lang="en"/>
-              <a:t>This means Thread 3 has a higher importance than all other threads in the application.</a:t>
-            </a:r>
-          </a:p>
-          <a:p>
-            <a:pPr rtl="0">
-              <a:spcBef>
-                <a:spcPts val="0"/>
-              </a:spcBef>
-              <a:buNone/>
-            </a:pPr>
-            <a:endParaRPr/>
-          </a:p>
-          <a:p>
-            <a:pPr rtl="0">
-              <a:spcBef>
-                <a:spcPts val="0"/>
-              </a:spcBef>
-              <a:buNone/>
-            </a:pPr>
-            <a:r>
-              <a:rPr lang="en">
-                <a:solidFill>
-                  <a:schemeClr val="dk1"/>
-                </a:solidFill>
-              </a:rPr>
-              <a:t>From 40 to 50 milliseconds Threads 3 and 4 get time on the processor.</a:t>
-            </a:r>
-          </a:p>
-          <a:p>
-            <a:pPr rtl="0">
-              <a:spcBef>
-                <a:spcPts val="0"/>
-              </a:spcBef>
-              <a:buNone/>
-            </a:pPr>
-            <a:r>
-              <a:rPr lang="en">
-                <a:solidFill>
-                  <a:schemeClr val="dk1"/>
-                </a:solidFill>
-              </a:rPr>
-              <a:t>From 50 to 60 milliseconds Threads 1 and 4 get time on the processor.</a:t>
-            </a:r>
-          </a:p>
-          <a:p>
-            <a:pPr rtl="0">
-              <a:spcBef>
-                <a:spcPts val="0"/>
-              </a:spcBef>
-              <a:buNone/>
-            </a:pPr>
-            <a:endParaRPr>
-              <a:solidFill>
-                <a:schemeClr val="dk1"/>
-              </a:solidFill>
-            </a:endParaRPr>
-          </a:p>
-          <a:p>
-            <a:pPr rtl="0">
-              <a:spcBef>
-                <a:spcPts val="0"/>
-              </a:spcBef>
-              <a:buNone/>
-            </a:pPr>
-            <a:r>
-              <a:rPr lang="en">
-                <a:solidFill>
-                  <a:schemeClr val="dk1"/>
-                </a:solidFill>
-              </a:rPr>
-              <a:t>This means Thread 4 has a higher importance than the other threads.</a:t>
-            </a:r>
-          </a:p>
-          <a:p>
-            <a:pPr rtl="0">
-              <a:spcBef>
-                <a:spcPts val="0"/>
-              </a:spcBef>
-              <a:buNone/>
-            </a:pPr>
-            <a:endParaRPr/>
-          </a:p>
-          <a:p>
-            <a:pPr>
-              <a:spcBef>
-                <a:spcPts val="0"/>
-              </a:spcBef>
-              <a:buNone/>
-            </a:pPr>
-            <a:r>
-              <a:rPr lang="en"/>
-              <a:t>If a 3 tiered level of importance is assumed, assign a level of importance to each thread.</a:t>
+              <a:t>6.These levels of importance determine how much processor time the Thread receives</a:t>
             </a:r>
           </a:p>
         </p:txBody>
@@ -3341,7 +3348,7 @@
   <p:cSld>
     <p:spTree>
       <p:nvGrpSpPr>
-        <p:cNvPr id="1" name="Shape 77"/>
+        <p:cNvPr id="1" name="Shape 62"/>
         <p:cNvGrpSpPr/>
         <p:nvPr/>
       </p:nvGrpSpPr>
@@ -3355,7 +3362,7 @@
       </p:grpSpPr>
       <p:sp>
         <p:nvSpPr>
-          <p:cNvPr id="78" name="Shape 78"/>
+          <p:cNvPr id="63" name="Shape 63"/>
           <p:cNvSpPr>
             <a:spLocks noGrp="1" noRot="1" noChangeAspect="1"/>
           </p:cNvSpPr>
@@ -3406,7 +3413,7 @@
       </p:sp>
       <p:sp>
         <p:nvSpPr>
-          <p:cNvPr id="79" name="Shape 79"/>
+          <p:cNvPr id="64" name="Shape 64"/>
           <p:cNvSpPr txBox="1">
             <a:spLocks noGrp="1"/>
           </p:cNvSpPr>
@@ -3429,6 +3436,184 @@
           </a:bodyPr>
           <a:lstStyle/>
           <a:p>
+            <a:pPr rtl="0">
+              <a:spcBef>
+                <a:spcPts val="0"/>
+              </a:spcBef>
+              <a:buNone/>
+            </a:pPr>
+            <a:r>
+              <a:rPr lang="en"/>
+              <a:t>From 0 to 10 milliseconds Threads 1 and 2 get time on the processor.</a:t>
+            </a:r>
+          </a:p>
+          <a:p>
+            <a:pPr rtl="0">
+              <a:spcBef>
+                <a:spcPts val="0"/>
+              </a:spcBef>
+              <a:buNone/>
+            </a:pPr>
+            <a:r>
+              <a:rPr lang="en"/>
+              <a:t>From 10 to 20 milliseconds Threads 3 and 4 get time on the processor.</a:t>
+            </a:r>
+          </a:p>
+          <a:p>
+            <a:pPr rtl="0">
+              <a:spcBef>
+                <a:spcPts val="0"/>
+              </a:spcBef>
+              <a:buNone/>
+            </a:pPr>
+            <a:endParaRPr/>
+          </a:p>
+          <a:p>
+            <a:pPr rtl="0">
+              <a:spcBef>
+                <a:spcPts val="0"/>
+              </a:spcBef>
+              <a:buNone/>
+            </a:pPr>
+            <a:r>
+              <a:rPr lang="en"/>
+              <a:t>This means each thread has the same level of importance.</a:t>
+            </a:r>
+          </a:p>
+          <a:p>
+            <a:pPr rtl="0">
+              <a:spcBef>
+                <a:spcPts val="0"/>
+              </a:spcBef>
+              <a:buNone/>
+            </a:pPr>
+            <a:endParaRPr/>
+          </a:p>
+          <a:p>
+            <a:pPr rtl="0">
+              <a:spcBef>
+                <a:spcPts val="0"/>
+              </a:spcBef>
+              <a:buNone/>
+            </a:pPr>
+            <a:r>
+              <a:rPr lang="en"/>
+              <a:t>From 20 to 30 milliseconds Threads 3 and 1 get time on the processor .</a:t>
+            </a:r>
+          </a:p>
+          <a:p>
+            <a:pPr rtl="0">
+              <a:spcBef>
+                <a:spcPts val="0"/>
+              </a:spcBef>
+              <a:buNone/>
+            </a:pPr>
+            <a:r>
+              <a:rPr lang="en"/>
+              <a:t>From 30 to 40 milliseconds Threads 3 and 2 get time on the processor.</a:t>
+            </a:r>
+          </a:p>
+          <a:p>
+            <a:pPr rtl="0">
+              <a:spcBef>
+                <a:spcPts val="0"/>
+              </a:spcBef>
+              <a:buNone/>
+            </a:pPr>
+            <a:endParaRPr/>
+          </a:p>
+          <a:p>
+            <a:pPr rtl="0">
+              <a:spcBef>
+                <a:spcPts val="0"/>
+              </a:spcBef>
+              <a:buNone/>
+            </a:pPr>
+            <a:r>
+              <a:rPr lang="en"/>
+              <a:t>This means Thread 3 has a higher importance than all other threads in the application.</a:t>
+            </a:r>
+          </a:p>
+          <a:p>
+            <a:pPr rtl="0">
+              <a:spcBef>
+                <a:spcPts val="0"/>
+              </a:spcBef>
+              <a:buNone/>
+            </a:pPr>
+            <a:endParaRPr/>
+          </a:p>
+          <a:p>
+            <a:pPr rtl="0">
+              <a:spcBef>
+                <a:spcPts val="0"/>
+              </a:spcBef>
+              <a:buNone/>
+            </a:pPr>
+            <a:r>
+              <a:rPr lang="en">
+                <a:solidFill>
+                  <a:schemeClr val="dk1"/>
+                </a:solidFill>
+              </a:rPr>
+              <a:t>From 40 to 50 milliseconds Threads 3 and 4 get time on the processor.</a:t>
+            </a:r>
+          </a:p>
+          <a:p>
+            <a:pPr rtl="0">
+              <a:spcBef>
+                <a:spcPts val="0"/>
+              </a:spcBef>
+              <a:buNone/>
+            </a:pPr>
+            <a:r>
+              <a:rPr lang="en">
+                <a:solidFill>
+                  <a:schemeClr val="dk1"/>
+                </a:solidFill>
+              </a:rPr>
+              <a:t>From 50 to 60 milliseconds Threads 1 and 4 get time on the processor.</a:t>
+            </a:r>
+          </a:p>
+          <a:p>
+            <a:pPr rtl="0">
+              <a:spcBef>
+                <a:spcPts val="0"/>
+              </a:spcBef>
+              <a:buNone/>
+            </a:pPr>
+            <a:endParaRPr>
+              <a:solidFill>
+                <a:schemeClr val="dk1"/>
+              </a:solidFill>
+            </a:endParaRPr>
+          </a:p>
+          <a:p>
+            <a:pPr rtl="0">
+              <a:spcBef>
+                <a:spcPts val="0"/>
+              </a:spcBef>
+              <a:buNone/>
+            </a:pPr>
+            <a:r>
+              <a:rPr lang="en">
+                <a:solidFill>
+                  <a:schemeClr val="dk1"/>
+                </a:solidFill>
+              </a:rPr>
+              <a:t>This means Thread 4 has a higher importance than the other threads.</a:t>
+            </a:r>
+          </a:p>
+          <a:p>
+            <a:pPr rtl="0">
+              <a:spcBef>
+                <a:spcPts val="0"/>
+              </a:spcBef>
+              <a:buNone/>
+            </a:pPr>
+            <a:endParaRPr/>
+          </a:p>
+          <a:p>
             <a:pPr>
               <a:spcBef>
                 <a:spcPts val="0"/>
@@ -3437,7 +3622,7 @@
             </a:pPr>
             <a:r>
               <a:rPr lang="en"/>
-              <a:t>The following three slides are all different ways to start a Thread.</a:t>
+              <a:t>If a 3 tiered level of importance is assumed, assign a level of importance to each thread.</a:t>
             </a:r>
           </a:p>
         </p:txBody>
@@ -3455,7 +3640,7 @@
   <p:cSld>
     <p:spTree>
       <p:nvGrpSpPr>
-        <p:cNvPr id="1" name="Shape 86"/>
+        <p:cNvPr id="1" name="Shape 77"/>
         <p:cNvGrpSpPr/>
         <p:nvPr/>
       </p:nvGrpSpPr>
@@ -3469,7 +3654,7 @@
       </p:grpSpPr>
       <p:sp>
         <p:nvSpPr>
-          <p:cNvPr id="87" name="Shape 87"/>
+          <p:cNvPr id="78" name="Shape 78"/>
           <p:cNvSpPr>
             <a:spLocks noGrp="1" noRot="1" noChangeAspect="1"/>
           </p:cNvSpPr>
@@ -3520,7 +3705,7 @@
       </p:sp>
       <p:sp>
         <p:nvSpPr>
-          <p:cNvPr id="88" name="Shape 88"/>
+          <p:cNvPr id="79" name="Shape 79"/>
           <p:cNvSpPr txBox="1">
             <a:spLocks noGrp="1"/>
           </p:cNvSpPr>
@@ -3549,7 +3734,10 @@
               </a:spcBef>
               <a:buNone/>
             </a:pPr>
-            <a:endParaRPr/>
+            <a:r>
+              <a:rPr lang="en"/>
+              <a:t>The following three slides are all different ways to start a Thread.</a:t>
+            </a:r>
           </a:p>
         </p:txBody>
       </p:sp>
@@ -5638,7 +5826,7 @@
   <p:cSld>
     <p:spTree>
       <p:nvGrpSpPr>
-        <p:cNvPr id="1" name="Shape 29"/>
+        <p:cNvPr id="1" name=""/>
         <p:cNvGrpSpPr/>
         <p:nvPr/>
       </p:nvGrpSpPr>
@@ -5650,95 +5838,320 @@
           <a:chExt cx="0" cy="0"/>
         </a:xfrm>
       </p:grpSpPr>
-      <p:sp>
-        <p:nvSpPr>
-          <p:cNvPr id="30" name="Shape 30"/>
-          <p:cNvSpPr txBox="1">
-            <a:spLocks noGrp="1"/>
-          </p:cNvSpPr>
-          <p:nvPr>
-            <p:ph type="ctrTitle"/>
-          </p:nvPr>
-        </p:nvSpPr>
-        <p:spPr>
-          <a:xfrm>
-            <a:off x="685800" y="1583342"/>
-            <a:ext cx="7772400" cy="1159856"/>
+      <p:pic>
+        <p:nvPicPr>
+          <p:cNvPr id="6" name="Picture 5" descr="Magnet Forensics background_1200px_1.jpg"/>
+          <p:cNvPicPr>
+            <a:picLocks noChangeAspect="1"/>
+          </p:cNvPicPr>
+          <p:nvPr/>
+        </p:nvPicPr>
+        <p:blipFill>
+          <a:blip r:embed="rId3">
+            <a:extLst>
+              <a:ext uri="{28A0092B-C50C-407E-A947-70E740481C1C}">
+                <a14:useLocalDpi xmlns:a14="http://schemas.microsoft.com/office/drawing/2010/main" val="0"/>
+              </a:ext>
+            </a:extLst>
+          </a:blip>
+          <a:stretch>
+            <a:fillRect/>
+          </a:stretch>
+        </p:blipFill>
+        <p:spPr>
+          <a:xfrm>
+            <a:off x="0" y="0"/>
+            <a:ext cx="9144000" cy="5143500"/>
           </a:xfrm>
           <a:prstGeom prst="rect">
             <a:avLst/>
           </a:prstGeom>
         </p:spPr>
+      </p:pic>
+      <p:sp>
+        <p:nvSpPr>
+          <p:cNvPr id="5" name="TextBox 4"/>
+          <p:cNvSpPr txBox="1"/>
+          <p:nvPr/>
+        </p:nvSpPr>
+        <p:spPr>
+          <a:xfrm>
+            <a:off x="7315200" y="4629150"/>
+            <a:ext cx="1066800" cy="338554"/>
+          </a:xfrm>
+          <a:prstGeom prst="rect">
+            <a:avLst/>
+          </a:prstGeom>
+          <a:noFill/>
+        </p:spPr>
         <p:txBody>
-          <a:bodyPr lIns="91425" tIns="91425" rIns="91425" bIns="91425" anchor="b" anchorCtr="0">
-            <a:noAutofit/>
+          <a:bodyPr wrap="square" rtlCol="0">
+            <a:spAutoFit/>
           </a:bodyPr>
           <a:lstStyle/>
           <a:p>
-            <a:pPr>
-              <a:spcBef>
-                <a:spcPts val="0"/>
-              </a:spcBef>
-              <a:buNone/>
-            </a:pPr>
-            <a:r>
-              <a:rPr lang="en" dirty="0"/>
-              <a:t>The basics of threading</a:t>
-            </a:r>
+            <a:r>
+              <a:rPr lang="en-US" sz="1600" dirty="0" smtClean="0">
+                <a:solidFill>
+                  <a:schemeClr val="bg1"/>
+                </a:solidFill>
+              </a:rPr>
+              <a:t>Hosted by</a:t>
+            </a:r>
+            <a:endParaRPr lang="en-US" sz="1600" dirty="0">
+              <a:solidFill>
+                <a:schemeClr val="bg1"/>
+              </a:solidFill>
+            </a:endParaRPr>
           </a:p>
         </p:txBody>
       </p:sp>
       <p:sp>
         <p:nvSpPr>
-          <p:cNvPr id="31" name="Shape 31"/>
-          <p:cNvSpPr txBox="1">
-            <a:spLocks noGrp="1"/>
-          </p:cNvSpPr>
-          <p:nvPr>
-            <p:ph type="subTitle" idx="1"/>
-          </p:nvPr>
-        </p:nvSpPr>
-        <p:spPr>
-          <a:xfrm>
-            <a:off x="685800" y="2840046"/>
-            <a:ext cx="7772400" cy="1634700"/>
+          <p:cNvPr id="7" name="TextBox 6"/>
+          <p:cNvSpPr txBox="1"/>
+          <p:nvPr/>
+        </p:nvSpPr>
+        <p:spPr>
+          <a:xfrm>
+            <a:off x="888941" y="1504950"/>
+            <a:ext cx="7520007" cy="1446550"/>
           </a:xfrm>
           <a:prstGeom prst="rect">
             <a:avLst/>
           </a:prstGeom>
+          <a:noFill/>
         </p:spPr>
         <p:txBody>
-          <a:bodyPr lIns="91425" tIns="91425" rIns="91425" bIns="91425" anchor="t" anchorCtr="0">
-            <a:noAutofit/>
+          <a:bodyPr wrap="none" rtlCol="0">
+            <a:spAutoFit/>
           </a:bodyPr>
           <a:lstStyle/>
           <a:p>
-            <a:pPr rtl="0">
-              <a:spcBef>
-                <a:spcPts val="0"/>
-              </a:spcBef>
-              <a:buNone/>
-            </a:pPr>
-            <a:r>
-              <a:rPr lang="en" dirty="0"/>
-              <a:t>Christopher </a:t>
-            </a:r>
-            <a:r>
-              <a:rPr lang="en" dirty="0" smtClean="0"/>
-              <a:t>Sippel</a:t>
-            </a:r>
-            <a:endParaRPr lang="en" dirty="0"/>
+            <a:r>
+              <a:rPr lang="en-US" sz="6600" dirty="0" smtClean="0">
+                <a:solidFill>
+                  <a:schemeClr val="bg1"/>
+                </a:solidFill>
+                <a:latin typeface="Avenir Black"/>
+                <a:cs typeface="Avenir Black"/>
+              </a:rPr>
+              <a:t>C#</a:t>
+            </a:r>
+            <a:r>
+              <a:rPr lang="en-US" sz="6600" dirty="0" smtClean="0"/>
+              <a:t> </a:t>
+            </a:r>
+            <a:r>
+              <a:rPr lang="en-US" sz="6600" dirty="0" smtClean="0">
+                <a:solidFill>
+                  <a:srgbClr val="3983C8"/>
+                </a:solidFill>
+                <a:latin typeface="Helvetica Neue Thin"/>
+                <a:cs typeface="Helvetica Neue Thin"/>
+              </a:rPr>
+              <a:t>DEV</a:t>
+            </a:r>
+            <a:r>
+              <a:rPr lang="en-US" sz="8800" b="1" dirty="0" smtClean="0">
+                <a:solidFill>
+                  <a:srgbClr val="FFFFFF"/>
+                </a:solidFill>
+              </a:rPr>
+              <a:t>/</a:t>
+            </a:r>
+            <a:r>
+              <a:rPr lang="en-US" sz="6600" dirty="0" smtClean="0">
+                <a:solidFill>
+                  <a:srgbClr val="3983C8"/>
+                </a:solidFill>
+                <a:latin typeface="Helvetica Neue Thin"/>
+                <a:cs typeface="Helvetica Neue Thin"/>
+              </a:rPr>
+              <a:t>CONNECT</a:t>
+            </a:r>
+            <a:endParaRPr lang="en-US" sz="6600" dirty="0">
+              <a:solidFill>
+                <a:srgbClr val="3983C8"/>
+              </a:solidFill>
+              <a:latin typeface="Helvetica Neue Thin"/>
+              <a:cs typeface="Helvetica Neue Thin"/>
+            </a:endParaRPr>
           </a:p>
         </p:txBody>
       </p:sp>
+      <p:pic>
+        <p:nvPicPr>
+          <p:cNvPr id="8" name="Picture 7" descr="Magnet M Logo.png"/>
+          <p:cNvPicPr>
+            <a:picLocks noChangeAspect="1"/>
+          </p:cNvPicPr>
+          <p:nvPr/>
+        </p:nvPicPr>
+        <p:blipFill>
+          <a:blip r:embed="rId4">
+            <a:extLst>
+              <a:ext uri="{28A0092B-C50C-407E-A947-70E740481C1C}">
+                <a14:useLocalDpi xmlns:a14="http://schemas.microsoft.com/office/drawing/2010/main" val="0"/>
+              </a:ext>
+            </a:extLst>
+          </a:blip>
+          <a:stretch>
+            <a:fillRect/>
+          </a:stretch>
+        </p:blipFill>
+        <p:spPr>
+          <a:xfrm>
+            <a:off x="8305800" y="4400550"/>
+            <a:ext cx="650403" cy="590550"/>
+          </a:xfrm>
+          <a:prstGeom prst="rect">
+            <a:avLst/>
+          </a:prstGeom>
+        </p:spPr>
+      </p:pic>
+      <p:sp>
+        <p:nvSpPr>
+          <p:cNvPr id="9" name="TextBox 8"/>
+          <p:cNvSpPr txBox="1"/>
+          <p:nvPr/>
+        </p:nvSpPr>
+        <p:spPr>
+          <a:xfrm>
+            <a:off x="990600" y="3028950"/>
+            <a:ext cx="6324600" cy="1421928"/>
+          </a:xfrm>
+          <a:prstGeom prst="rect">
+            <a:avLst/>
+          </a:prstGeom>
+          <a:noFill/>
+        </p:spPr>
+        <p:txBody>
+          <a:bodyPr wrap="square" rtlCol="0">
+            <a:spAutoFit/>
+          </a:bodyPr>
+          <a:lstStyle/>
+          <a:p>
+            <a:pPr>
+              <a:lnSpc>
+                <a:spcPct val="120000"/>
+              </a:lnSpc>
+            </a:pPr>
+            <a:r>
+              <a:rPr lang="en-US" sz="2400" dirty="0" smtClean="0">
+                <a:solidFill>
+                  <a:srgbClr val="FFFFFF"/>
+                </a:solidFill>
+              </a:rPr>
+              <a:t>Twitter: @</a:t>
+            </a:r>
+            <a:r>
+              <a:rPr lang="en-US" sz="2400" dirty="0" err="1" smtClean="0">
+                <a:solidFill>
+                  <a:srgbClr val="FFFFFF"/>
+                </a:solidFill>
+              </a:rPr>
+              <a:t>CSDevConnect</a:t>
+            </a:r>
+            <a:r>
+              <a:rPr lang="en-US" sz="2400" dirty="0">
+                <a:solidFill>
+                  <a:srgbClr val="FFFFFF"/>
+                </a:solidFill>
+              </a:rPr>
+              <a:t> </a:t>
+            </a:r>
+            <a:r>
+              <a:rPr lang="en-US" sz="2400" dirty="0" smtClean="0">
+                <a:solidFill>
+                  <a:srgbClr val="FFFFFF"/>
+                </a:solidFill>
+              </a:rPr>
+              <a:t>#</a:t>
+            </a:r>
+            <a:r>
+              <a:rPr lang="en-US" sz="2400" dirty="0" err="1" smtClean="0">
+                <a:solidFill>
+                  <a:srgbClr val="FFFFFF"/>
+                </a:solidFill>
+              </a:rPr>
+              <a:t>CSDevConnect</a:t>
+            </a:r>
+            <a:endParaRPr lang="en-US" sz="2400" dirty="0" smtClean="0">
+              <a:solidFill>
+                <a:srgbClr val="FFFFFF"/>
+              </a:solidFill>
+            </a:endParaRPr>
+          </a:p>
+          <a:p>
+            <a:pPr>
+              <a:lnSpc>
+                <a:spcPct val="120000"/>
+              </a:lnSpc>
+            </a:pPr>
+            <a:r>
+              <a:rPr lang="en-US" sz="2400" dirty="0" smtClean="0">
+                <a:solidFill>
+                  <a:srgbClr val="FFFFFF"/>
+                </a:solidFill>
+              </a:rPr>
+              <a:t>Email: </a:t>
+            </a:r>
+            <a:r>
+              <a:rPr lang="en-US" sz="2400" dirty="0" smtClean="0">
+                <a:solidFill>
+                  <a:srgbClr val="FFFFFF"/>
+                </a:solidFill>
+                <a:hlinkClick r:id="rId5"/>
+              </a:rPr>
+              <a:t>csharpdevconnect@gmail.com</a:t>
+            </a:r>
+            <a:endParaRPr lang="en-US" sz="2400" dirty="0" smtClean="0">
+              <a:solidFill>
+                <a:srgbClr val="FFFFFF"/>
+              </a:solidFill>
+            </a:endParaRPr>
+          </a:p>
+          <a:p>
+            <a:pPr>
+              <a:lnSpc>
+                <a:spcPct val="120000"/>
+              </a:lnSpc>
+            </a:pPr>
+            <a:r>
+              <a:rPr lang="en-US" sz="2400" dirty="0" err="1" smtClean="0">
+                <a:solidFill>
+                  <a:srgbClr val="FFFFFF"/>
+                </a:solidFill>
+              </a:rPr>
+              <a:t>Github</a:t>
+            </a:r>
+            <a:r>
+              <a:rPr lang="en-US" sz="2400" dirty="0">
+                <a:solidFill>
+                  <a:srgbClr val="FFFFFF"/>
+                </a:solidFill>
+              </a:rPr>
+              <a:t>: https://github.com/CSharpDevConnect/</a:t>
+            </a:r>
+            <a:endParaRPr lang="en-US" sz="2400" dirty="0" smtClean="0">
+              <a:solidFill>
+                <a:srgbClr val="FFFFFF"/>
+              </a:solidFill>
+            </a:endParaRPr>
+          </a:p>
+        </p:txBody>
+      </p:sp>
     </p:spTree>
+    <p:extLst>
+      <p:ext uri="{BB962C8B-B14F-4D97-AF65-F5344CB8AC3E}">
+        <p14:creationId xmlns:p14="http://schemas.microsoft.com/office/powerpoint/2010/main" val="2223295814"/>
+      </p:ext>
+    </p:extLst>
   </p:cSld>
   <p:clrMapOvr>
     <a:masterClrMapping/>
   </p:clrMapOvr>
-  <p:transition spd="slow">
-    <p:cut/>
-  </p:transition>
   <p:timing>
     <p:tnLst>
       <p:par>
@@ -5754,7 +6167,7 @@
   <p:cSld>
     <p:spTree>
       <p:nvGrpSpPr>
-        <p:cNvPr id="1" name="Shape 89"/>
+        <p:cNvPr id="1" name="Shape 80"/>
         <p:cNvGrpSpPr/>
         <p:nvPr/>
       </p:nvGrpSpPr>
@@ -5768,7 +6181,7 @@
       </p:grpSpPr>
       <p:sp>
         <p:nvSpPr>
-          <p:cNvPr id="90" name="Shape 90"/>
+          <p:cNvPr id="81" name="Shape 81"/>
           <p:cNvSpPr txBox="1">
             <a:spLocks noGrp="1"/>
           </p:cNvSpPr>
@@ -5791,7 +6204,7 @@
           </a:bodyPr>
           <a:lstStyle/>
           <a:p>
-            <a:pPr lvl="0" rtl="0">
+            <a:pPr>
               <a:spcBef>
                 <a:spcPts val="0"/>
               </a:spcBef>
@@ -5806,7 +6219,7 @@
       </p:sp>
       <p:sp>
         <p:nvSpPr>
-          <p:cNvPr id="91" name="Shape 91"/>
+          <p:cNvPr id="82" name="Shape 82"/>
           <p:cNvSpPr txBox="1"/>
           <p:nvPr/>
         </p:nvSpPr>
@@ -5842,9 +6255,47 @@
           </a:p>
         </p:txBody>
       </p:sp>
+      <p:sp>
+        <p:nvSpPr>
+          <p:cNvPr id="83" name="Shape 83"/>
+          <p:cNvSpPr txBox="1"/>
+          <p:nvPr/>
+        </p:nvSpPr>
+        <p:spPr>
+          <a:xfrm>
+            <a:off x="457200" y="2956300"/>
+            <a:ext cx="7649399" cy="466799"/>
+          </a:xfrm>
+          <a:prstGeom prst="rect">
+            <a:avLst/>
+          </a:prstGeom>
+          <a:noFill/>
+          <a:ln>
+            <a:noFill/>
+          </a:ln>
+        </p:spPr>
+        <p:txBody>
+          <a:bodyPr lIns="91425" tIns="91425" rIns="91425" bIns="91425" anchor="t" anchorCtr="0">
+            <a:noAutofit/>
+          </a:bodyPr>
+          <a:lstStyle/>
+          <a:p>
+            <a:pPr lvl="0" rtl="0">
+              <a:spcBef>
+                <a:spcPts val="0"/>
+              </a:spcBef>
+              <a:buNone/>
+            </a:pPr>
+            <a:r>
+              <a:rPr lang="en" sz="1800"/>
+              <a:t>Creating a Thread using an anonymous delegate that takes a parameter</a:t>
+            </a:r>
+          </a:p>
+        </p:txBody>
+      </p:sp>
       <p:pic>
         <p:nvPicPr>
-          <p:cNvPr id="92" name="Shape 92"/>
+          <p:cNvPr id="84" name="Shape 84"/>
           <p:cNvPicPr preferRelativeResize="0"/>
           <p:nvPr/>
         </p:nvPicPr>
@@ -5858,8 +6309,36 @@
         </p:blipFill>
         <p:spPr>
           <a:xfrm>
-            <a:off x="179150" y="1443225"/>
-            <a:ext cx="8658225" cy="2562225"/>
+            <a:off x="457200" y="1443225"/>
+            <a:ext cx="5743575" cy="1514475"/>
+          </a:xfrm>
+          <a:prstGeom prst="rect">
+            <a:avLst/>
+          </a:prstGeom>
+          <a:noFill/>
+          <a:ln>
+            <a:noFill/>
+          </a:ln>
+        </p:spPr>
+      </p:pic>
+      <p:pic>
+        <p:nvPicPr>
+          <p:cNvPr id="85" name="Shape 85"/>
+          <p:cNvPicPr preferRelativeResize="0"/>
+          <p:nvPr/>
+        </p:nvPicPr>
+        <p:blipFill>
+          <a:blip r:embed="rId4">
+            <a:alphaModFix/>
+          </a:blip>
+          <a:stretch>
+            <a:fillRect/>
+          </a:stretch>
+        </p:blipFill>
+        <p:spPr>
+          <a:xfrm>
+            <a:off x="457200" y="3423100"/>
+            <a:ext cx="6591300" cy="1504950"/>
           </a:xfrm>
           <a:prstGeom prst="rect">
             <a:avLst/>
@@ -5893,7 +6372,7 @@
   <p:cSld>
     <p:spTree>
       <p:nvGrpSpPr>
-        <p:cNvPr id="1" name="Shape 96"/>
+        <p:cNvPr id="1" name="Shape 89"/>
         <p:cNvGrpSpPr/>
         <p:nvPr/>
       </p:nvGrpSpPr>
@@ -5907,7 +6386,7 @@
       </p:grpSpPr>
       <p:sp>
         <p:nvSpPr>
-          <p:cNvPr id="97" name="Shape 97"/>
+          <p:cNvPr id="90" name="Shape 90"/>
           <p:cNvSpPr txBox="1">
             <a:spLocks noGrp="1"/>
           </p:cNvSpPr>
@@ -5930,7 +6409,7 @@
           </a:bodyPr>
           <a:lstStyle/>
           <a:p>
-            <a:pPr>
+            <a:pPr lvl="0" rtl="0">
               <a:spcBef>
                 <a:spcPts val="0"/>
               </a:spcBef>
@@ -5938,14 +6417,52 @@
             </a:pPr>
             <a:r>
               <a:rPr lang="en"/>
-              <a:t>.NET 2.0 - Aborting Threads</a:t>
+              <a:t>Cont.</a:t>
+            </a:r>
+          </a:p>
+        </p:txBody>
+      </p:sp>
+      <p:sp>
+        <p:nvSpPr>
+          <p:cNvPr id="91" name="Shape 91"/>
+          <p:cNvSpPr txBox="1"/>
+          <p:nvPr/>
+        </p:nvSpPr>
+        <p:spPr>
+          <a:xfrm>
+            <a:off x="457200" y="976425"/>
+            <a:ext cx="5428799" cy="466799"/>
+          </a:xfrm>
+          <a:prstGeom prst="rect">
+            <a:avLst/>
+          </a:prstGeom>
+          <a:noFill/>
+          <a:ln>
+            <a:noFill/>
+          </a:ln>
+        </p:spPr>
+        <p:txBody>
+          <a:bodyPr lIns="91425" tIns="91425" rIns="91425" bIns="91425" anchor="t" anchorCtr="0">
+            <a:noAutofit/>
+          </a:bodyPr>
+          <a:lstStyle/>
+          <a:p>
+            <a:pPr lvl="0" rtl="0">
+              <a:spcBef>
+                <a:spcPts val="0"/>
+              </a:spcBef>
+              <a:buNone/>
+            </a:pPr>
+            <a:r>
+              <a:rPr lang="en" sz="1800"/>
+              <a:t>Creating a Thread using an anonymous delegate</a:t>
             </a:r>
           </a:p>
         </p:txBody>
       </p:sp>
       <p:pic>
         <p:nvPicPr>
-          <p:cNvPr id="98" name="Shape 98"/>
+          <p:cNvPr id="92" name="Shape 92"/>
           <p:cNvPicPr preferRelativeResize="0"/>
           <p:nvPr/>
         </p:nvPicPr>
@@ -5959,8 +6476,8 @@
         </p:blipFill>
         <p:spPr>
           <a:xfrm>
-            <a:off x="457200" y="1490100"/>
-            <a:ext cx="5638800" cy="2219325"/>
+            <a:off x="179150" y="1443225"/>
+            <a:ext cx="8658225" cy="2562225"/>
           </a:xfrm>
           <a:prstGeom prst="rect">
             <a:avLst/>
@@ -5971,44 +6488,6 @@
           </a:ln>
         </p:spPr>
       </p:pic>
-      <p:sp>
-        <p:nvSpPr>
-          <p:cNvPr id="99" name="Shape 99"/>
-          <p:cNvSpPr txBox="1"/>
-          <p:nvPr/>
-        </p:nvSpPr>
-        <p:spPr>
-          <a:xfrm>
-            <a:off x="457200" y="1023300"/>
-            <a:ext cx="8444400" cy="466799"/>
-          </a:xfrm>
-          <a:prstGeom prst="rect">
-            <a:avLst/>
-          </a:prstGeom>
-          <a:noFill/>
-          <a:ln>
-            <a:noFill/>
-          </a:ln>
-        </p:spPr>
-        <p:txBody>
-          <a:bodyPr lIns="91425" tIns="91425" rIns="91425" bIns="91425" anchor="t" anchorCtr="0">
-            <a:noAutofit/>
-          </a:bodyPr>
-          <a:lstStyle/>
-          <a:p>
-            <a:pPr lvl="0" rtl="0">
-              <a:spcBef>
-                <a:spcPts val="0"/>
-              </a:spcBef>
-              <a:buNone/>
-            </a:pPr>
-            <a:r>
-              <a:rPr lang="en" sz="1700"/>
-              <a:t>Creating a Thread using a ThreadStart object then terminate it after 50 milliseconds</a:t>
-            </a:r>
-          </a:p>
-        </p:txBody>
-      </p:sp>
     </p:spTree>
   </p:cSld>
   <p:clrMapOvr>
@@ -6032,7 +6511,7 @@
   <p:cSld>
     <p:spTree>
       <p:nvGrpSpPr>
-        <p:cNvPr id="1" name="Shape 103"/>
+        <p:cNvPr id="1" name="Shape 96"/>
         <p:cNvGrpSpPr/>
         <p:nvPr/>
       </p:nvGrpSpPr>
@@ -6046,7 +6525,7 @@
       </p:grpSpPr>
       <p:sp>
         <p:nvSpPr>
-          <p:cNvPr id="104" name="Shape 104"/>
+          <p:cNvPr id="97" name="Shape 97"/>
           <p:cNvSpPr txBox="1">
             <a:spLocks noGrp="1"/>
           </p:cNvSpPr>
@@ -6076,20 +6555,15 @@
               <a:buNone/>
             </a:pPr>
             <a:r>
-              <a:rPr lang="en" dirty="0"/>
-              <a:t>.NET 2.0 </a:t>
-            </a:r>
-            <a:r>
-              <a:rPr lang="en" dirty="0" smtClean="0"/>
-              <a:t>– Background Worker</a:t>
-            </a:r>
-            <a:endParaRPr lang="en" dirty="0"/>
+              <a:rPr lang="en"/>
+              <a:t>.NET 2.0 - Aborting Threads</a:t>
+            </a:r>
           </a:p>
         </p:txBody>
       </p:sp>
       <p:pic>
         <p:nvPicPr>
-          <p:cNvPr id="105" name="Shape 105"/>
+          <p:cNvPr id="98" name="Shape 98"/>
           <p:cNvPicPr preferRelativeResize="0"/>
           <p:nvPr/>
         </p:nvPicPr>
@@ -6103,8 +6577,8 @@
         </p:blipFill>
         <p:spPr>
           <a:xfrm>
-            <a:off x="457200" y="1653175"/>
-            <a:ext cx="5534025" cy="1657350"/>
+            <a:off x="457200" y="1490100"/>
+            <a:ext cx="5638800" cy="2219325"/>
           </a:xfrm>
           <a:prstGeom prst="rect">
             <a:avLst/>
@@ -6117,14 +6591,14 @@
       </p:pic>
       <p:sp>
         <p:nvSpPr>
-          <p:cNvPr id="106" name="Shape 106"/>
+          <p:cNvPr id="99" name="Shape 99"/>
           <p:cNvSpPr txBox="1"/>
           <p:nvPr/>
         </p:nvSpPr>
         <p:spPr>
           <a:xfrm>
-            <a:off x="465025" y="1211900"/>
-            <a:ext cx="7278300" cy="441300"/>
+            <a:off x="457200" y="1023300"/>
+            <a:ext cx="8444400" cy="466799"/>
           </a:xfrm>
           <a:prstGeom prst="rect">
             <a:avLst/>
@@ -6140,15 +6614,15 @@
           </a:bodyPr>
           <a:lstStyle/>
           <a:p>
-            <a:pPr>
-              <a:spcBef>
-                <a:spcPts val="0"/>
-              </a:spcBef>
-              <a:buNone/>
-            </a:pPr>
-            <a:r>
-              <a:rPr lang="en"/>
-              <a:t>Creating and starting a Thread and setting the IsBackground property to True</a:t>
+            <a:pPr lvl="0" rtl="0">
+              <a:spcBef>
+                <a:spcPts val="0"/>
+              </a:spcBef>
+              <a:buNone/>
+            </a:pPr>
+            <a:r>
+              <a:rPr lang="en" sz="1700"/>
+              <a:t>Creating a Thread using a ThreadStart object then terminate it after 50 milliseconds</a:t>
             </a:r>
           </a:p>
         </p:txBody>
@@ -6176,7 +6650,7 @@
   <p:cSld>
     <p:spTree>
       <p:nvGrpSpPr>
-        <p:cNvPr id="1" name="Shape 110"/>
+        <p:cNvPr id="1" name="Shape 103"/>
         <p:cNvGrpSpPr/>
         <p:nvPr/>
       </p:nvGrpSpPr>
@@ -6190,7 +6664,7 @@
       </p:grpSpPr>
       <p:sp>
         <p:nvSpPr>
-          <p:cNvPr id="111" name="Shape 111"/>
+          <p:cNvPr id="104" name="Shape 104"/>
           <p:cNvSpPr txBox="1">
             <a:spLocks noGrp="1"/>
           </p:cNvSpPr>
@@ -6220,15 +6694,20 @@
               <a:buNone/>
             </a:pPr>
             <a:r>
-              <a:rPr lang="en"/>
-              <a:t>Cont.</a:t>
-            </a:r>
+              <a:rPr lang="en" dirty="0"/>
+              <a:t>.NET 2.0 </a:t>
+            </a:r>
+            <a:r>
+              <a:rPr lang="en" dirty="0" smtClean="0"/>
+              <a:t>– Background Worker</a:t>
+            </a:r>
+            <a:endParaRPr lang="en" dirty="0"/>
           </a:p>
         </p:txBody>
       </p:sp>
       <p:pic>
         <p:nvPicPr>
-          <p:cNvPr id="112" name="Shape 112"/>
+          <p:cNvPr id="105" name="Shape 105"/>
           <p:cNvPicPr preferRelativeResize="0"/>
           <p:nvPr/>
         </p:nvPicPr>
@@ -6242,8 +6721,8 @@
         </p:blipFill>
         <p:spPr>
           <a:xfrm>
-            <a:off x="497650" y="1014050"/>
-            <a:ext cx="5182712" cy="4012674"/>
+            <a:off x="457200" y="1653175"/>
+            <a:ext cx="5534025" cy="1657350"/>
           </a:xfrm>
           <a:prstGeom prst="rect">
             <a:avLst/>
@@ -6254,6 +6733,44 @@
           </a:ln>
         </p:spPr>
       </p:pic>
+      <p:sp>
+        <p:nvSpPr>
+          <p:cNvPr id="106" name="Shape 106"/>
+          <p:cNvSpPr txBox="1"/>
+          <p:nvPr/>
+        </p:nvSpPr>
+        <p:spPr>
+          <a:xfrm>
+            <a:off x="465025" y="1211900"/>
+            <a:ext cx="7278300" cy="441300"/>
+          </a:xfrm>
+          <a:prstGeom prst="rect">
+            <a:avLst/>
+          </a:prstGeom>
+          <a:noFill/>
+          <a:ln>
+            <a:noFill/>
+          </a:ln>
+        </p:spPr>
+        <p:txBody>
+          <a:bodyPr lIns="91425" tIns="91425" rIns="91425" bIns="91425" anchor="t" anchorCtr="0">
+            <a:noAutofit/>
+          </a:bodyPr>
+          <a:lstStyle/>
+          <a:p>
+            <a:pPr>
+              <a:spcBef>
+                <a:spcPts val="0"/>
+              </a:spcBef>
+              <a:buNone/>
+            </a:pPr>
+            <a:r>
+              <a:rPr lang="en"/>
+              <a:t>Creating and starting a Thread and setting the IsBackground property to True</a:t>
+            </a:r>
+          </a:p>
+        </p:txBody>
+      </p:sp>
     </p:spTree>
   </p:cSld>
   <p:clrMapOvr>
@@ -6277,7 +6794,7 @@
   <p:cSld>
     <p:spTree>
       <p:nvGrpSpPr>
-        <p:cNvPr id="1" name="Shape 116"/>
+        <p:cNvPr id="1" name="Shape 110"/>
         <p:cNvGrpSpPr/>
         <p:nvPr/>
       </p:nvGrpSpPr>
@@ -6291,7 +6808,7 @@
       </p:grpSpPr>
       <p:sp>
         <p:nvSpPr>
-          <p:cNvPr id="117" name="Shape 117"/>
+          <p:cNvPr id="111" name="Shape 111"/>
           <p:cNvSpPr txBox="1">
             <a:spLocks noGrp="1"/>
           </p:cNvSpPr>
@@ -6329,7 +6846,7 @@
       </p:sp>
       <p:pic>
         <p:nvPicPr>
-          <p:cNvPr id="118" name="Shape 118"/>
+          <p:cNvPr id="112" name="Shape 112"/>
           <p:cNvPicPr preferRelativeResize="0"/>
           <p:nvPr/>
         </p:nvPicPr>
@@ -6343,8 +6860,8 @@
         </p:blipFill>
         <p:spPr>
           <a:xfrm>
-            <a:off x="399000" y="991050"/>
-            <a:ext cx="4441524" cy="4053999"/>
+            <a:off x="497650" y="1014050"/>
+            <a:ext cx="5182712" cy="4012674"/>
           </a:xfrm>
           <a:prstGeom prst="rect">
             <a:avLst/>
@@ -6378,7 +6895,7 @@
   <p:cSld>
     <p:spTree>
       <p:nvGrpSpPr>
-        <p:cNvPr id="1" name="Shape 122"/>
+        <p:cNvPr id="1" name="Shape 116"/>
         <p:cNvGrpSpPr/>
         <p:nvPr/>
       </p:nvGrpSpPr>
@@ -6392,7 +6909,7 @@
       </p:grpSpPr>
       <p:sp>
         <p:nvSpPr>
-          <p:cNvPr id="123" name="Shape 123"/>
+          <p:cNvPr id="117" name="Shape 117"/>
           <p:cNvSpPr txBox="1">
             <a:spLocks noGrp="1"/>
           </p:cNvSpPr>
@@ -6422,15 +6939,16 @@
               <a:buNone/>
             </a:pPr>
             <a:r>
-              <a:rPr lang="en"/>
-              <a:t>Cont.</a:t>
-            </a:r>
+              <a:rPr lang="en" dirty="0" smtClean="0"/>
+              <a:t>Background Worker - Cancelling</a:t>
+            </a:r>
+            <a:endParaRPr lang="en" dirty="0"/>
           </a:p>
         </p:txBody>
       </p:sp>
       <p:pic>
         <p:nvPicPr>
-          <p:cNvPr id="124" name="Shape 124"/>
+          <p:cNvPr id="118" name="Shape 118"/>
           <p:cNvPicPr preferRelativeResize="0"/>
           <p:nvPr/>
         </p:nvPicPr>
@@ -6444,8 +6962,8 @@
         </p:blipFill>
         <p:spPr>
           <a:xfrm>
-            <a:off x="251050" y="967150"/>
-            <a:ext cx="5815450" cy="4176349"/>
+            <a:off x="399000" y="991050"/>
+            <a:ext cx="4441524" cy="4053999"/>
           </a:xfrm>
           <a:prstGeom prst="rect">
             <a:avLst/>
@@ -6479,6 +6997,107 @@
   <p:cSld>
     <p:spTree>
       <p:nvGrpSpPr>
+        <p:cNvPr id="1" name="Shape 122"/>
+        <p:cNvGrpSpPr/>
+        <p:nvPr/>
+      </p:nvGrpSpPr>
+      <p:grpSpPr>
+        <a:xfrm>
+          <a:off x="0" y="0"/>
+          <a:ext cx="0" cy="0"/>
+          <a:chOff x="0" y="0"/>
+          <a:chExt cx="0" cy="0"/>
+        </a:xfrm>
+      </p:grpSpPr>
+      <p:sp>
+        <p:nvSpPr>
+          <p:cNvPr id="123" name="Shape 123"/>
+          <p:cNvSpPr txBox="1">
+            <a:spLocks noGrp="1"/>
+          </p:cNvSpPr>
+          <p:nvPr>
+            <p:ph type="title"/>
+          </p:nvPr>
+        </p:nvSpPr>
+        <p:spPr>
+          <a:xfrm>
+            <a:off x="457200" y="205978"/>
+            <a:ext cx="8229600" cy="857400"/>
+          </a:xfrm>
+          <a:prstGeom prst="rect">
+            <a:avLst/>
+          </a:prstGeom>
+        </p:spPr>
+        <p:txBody>
+          <a:bodyPr lIns="91425" tIns="91425" rIns="91425" bIns="91425" anchor="b" anchorCtr="0">
+            <a:noAutofit/>
+          </a:bodyPr>
+          <a:lstStyle/>
+          <a:p>
+            <a:pPr>
+              <a:spcBef>
+                <a:spcPts val="0"/>
+              </a:spcBef>
+              <a:buNone/>
+            </a:pPr>
+            <a:r>
+              <a:rPr lang="en"/>
+              <a:t>Cont.</a:t>
+            </a:r>
+          </a:p>
+        </p:txBody>
+      </p:sp>
+      <p:pic>
+        <p:nvPicPr>
+          <p:cNvPr id="124" name="Shape 124"/>
+          <p:cNvPicPr preferRelativeResize="0"/>
+          <p:nvPr/>
+        </p:nvPicPr>
+        <p:blipFill>
+          <a:blip r:embed="rId3">
+            <a:alphaModFix/>
+          </a:blip>
+          <a:stretch>
+            <a:fillRect/>
+          </a:stretch>
+        </p:blipFill>
+        <p:spPr>
+          <a:xfrm>
+            <a:off x="251050" y="967150"/>
+            <a:ext cx="5815450" cy="4176349"/>
+          </a:xfrm>
+          <a:prstGeom prst="rect">
+            <a:avLst/>
+          </a:prstGeom>
+          <a:noFill/>
+          <a:ln>
+            <a:noFill/>
+          </a:ln>
+        </p:spPr>
+      </p:pic>
+    </p:spTree>
+  </p:cSld>
+  <p:clrMapOvr>
+    <a:masterClrMapping/>
+  </p:clrMapOvr>
+  <p:transition spd="slow">
+    <p:cut/>
+  </p:transition>
+  <p:timing>
+    <p:tnLst>
+      <p:par>
+        <p:cTn id="1" dur="indefinite" restart="never" nodeType="tmRoot"/>
+      </p:par>
+    </p:tnLst>
+  </p:timing>
+</p:sld>
+</file>
+
+<file path=ppt/slides/slide17.xml><?xml version="1.0" encoding="utf-8"?>
+<p:sld xmlns:a="http://schemas.openxmlformats.org/drawingml/2006/main" xmlns:r="http://schemas.openxmlformats.org/officeDocument/2006/relationships" xmlns:p="http://schemas.openxmlformats.org/presentationml/2006/main">
+  <p:cSld>
+    <p:spTree>
+      <p:nvGrpSpPr>
         <p:cNvPr id="1" name=""/>
         <p:cNvGrpSpPr/>
         <p:nvPr/>
@@ -6553,7 +7172,7 @@
 </p:sld>
 </file>
 
-<file path=ppt/slides/slide17.xml><?xml version="1.0" encoding="utf-8"?>
+<file path=ppt/slides/slide18.xml><?xml version="1.0" encoding="utf-8"?>
 <p:sld xmlns:a="http://schemas.openxmlformats.org/drawingml/2006/main" xmlns:r="http://schemas.openxmlformats.org/officeDocument/2006/relationships" xmlns:p="http://schemas.openxmlformats.org/presentationml/2006/main">
   <p:cSld>
     <p:spTree>
@@ -6744,7 +7363,15 @@
             </a:pPr>
             <a:r>
               <a:rPr lang="en" sz="2400" dirty="0" smtClean="0"/>
-              <a:t>The biggest advantage os async/await is not needing to worry about thread managment</a:t>
+              <a:t>The biggest </a:t>
+            </a:r>
+            <a:r>
+              <a:rPr lang="en" sz="2400" smtClean="0"/>
+              <a:t>advantage of </a:t>
+            </a:r>
+            <a:r>
+              <a:rPr lang="en" sz="2400" dirty="0" smtClean="0"/>
+              <a:t>async/await is not needing to worry about thread managment</a:t>
             </a:r>
           </a:p>
         </p:txBody>
@@ -6767,7 +7394,7 @@
 </p:sld>
 </file>
 
-<file path=ppt/slides/slide18.xml><?xml version="1.0" encoding="utf-8"?>
+<file path=ppt/slides/slide19.xml><?xml version="1.0" encoding="utf-8"?>
 <p:sld xmlns:a="http://schemas.openxmlformats.org/drawingml/2006/main" xmlns:r="http://schemas.openxmlformats.org/officeDocument/2006/relationships" xmlns:p="http://schemas.openxmlformats.org/presentationml/2006/main">
   <p:cSld>
     <p:spTree>
@@ -6948,12 +7575,12 @@
 </p:sld>
 </file>
 
-<file path=ppt/slides/slide19.xml><?xml version="1.0" encoding="utf-8"?>
+<file path=ppt/slides/slide2.xml><?xml version="1.0" encoding="utf-8"?>
 <p:sld xmlns:a="http://schemas.openxmlformats.org/drawingml/2006/main" xmlns:r="http://schemas.openxmlformats.org/officeDocument/2006/relationships" xmlns:p="http://schemas.openxmlformats.org/presentationml/2006/main">
   <p:cSld>
     <p:spTree>
       <p:nvGrpSpPr>
-        <p:cNvPr id="1" name="Shape 134"/>
+        <p:cNvPr id="1" name="Shape 29"/>
         <p:cNvGrpSpPr/>
         <p:nvPr/>
       </p:nvGrpSpPr>
@@ -6967,18 +7594,18 @@
       </p:grpSpPr>
       <p:sp>
         <p:nvSpPr>
-          <p:cNvPr id="135" name="Shape 135"/>
+          <p:cNvPr id="30" name="Shape 30"/>
           <p:cNvSpPr txBox="1">
             <a:spLocks noGrp="1"/>
           </p:cNvSpPr>
           <p:nvPr>
-            <p:ph type="title"/>
+            <p:ph type="ctrTitle"/>
           </p:nvPr>
         </p:nvSpPr>
         <p:spPr>
           <a:xfrm>
-            <a:off x="457200" y="205978"/>
-            <a:ext cx="8229600" cy="857400"/>
+            <a:off x="685800" y="1583342"/>
+            <a:ext cx="7772400" cy="1159856"/>
           </a:xfrm>
           <a:prstGeom prst="rect">
             <a:avLst/>
@@ -6997,127 +7624,26 @@
               <a:buNone/>
             </a:pPr>
             <a:r>
-              <a:rPr lang="en"/>
-              <a:t>Async/Await - Basic Sample</a:t>
+              <a:rPr lang="en" dirty="0"/>
+              <a:t>The basics of threading</a:t>
             </a:r>
           </a:p>
         </p:txBody>
       </p:sp>
-      <p:pic>
-        <p:nvPicPr>
-          <p:cNvPr id="136" name="Shape 136"/>
-          <p:cNvPicPr preferRelativeResize="0"/>
-          <p:nvPr/>
-        </p:nvPicPr>
-        <p:blipFill>
-          <a:blip r:embed="rId3">
-            <a:alphaModFix/>
-          </a:blip>
-          <a:stretch>
-            <a:fillRect/>
-          </a:stretch>
-        </p:blipFill>
-        <p:spPr>
-          <a:xfrm>
-            <a:off x="457200" y="1063375"/>
-            <a:ext cx="6124575" cy="3181350"/>
-          </a:xfrm>
-          <a:prstGeom prst="rect">
-            <a:avLst/>
-          </a:prstGeom>
-          <a:noFill/>
-          <a:ln>
-            <a:noFill/>
-          </a:ln>
-        </p:spPr>
-      </p:pic>
-    </p:spTree>
-  </p:cSld>
-  <p:clrMapOvr>
-    <a:masterClrMapping/>
-  </p:clrMapOvr>
-  <p:transition spd="slow">
-    <p:cut/>
-  </p:transition>
-  <p:timing>
-    <p:tnLst>
-      <p:par>
-        <p:cTn id="1" dur="indefinite" restart="never" nodeType="tmRoot"/>
-      </p:par>
-    </p:tnLst>
-  </p:timing>
-</p:sld>
-</file>
-
-<file path=ppt/slides/slide2.xml><?xml version="1.0" encoding="utf-8"?>
-<p:sld xmlns:a="http://schemas.openxmlformats.org/drawingml/2006/main" xmlns:r="http://schemas.openxmlformats.org/officeDocument/2006/relationships" xmlns:p="http://schemas.openxmlformats.org/presentationml/2006/main">
-  <p:cSld>
-    <p:spTree>
-      <p:nvGrpSpPr>
-        <p:cNvPr id="1" name="Shape 35"/>
-        <p:cNvGrpSpPr/>
-        <p:nvPr/>
-      </p:nvGrpSpPr>
-      <p:grpSpPr>
-        <a:xfrm>
-          <a:off x="0" y="0"/>
-          <a:ext cx="0" cy="0"/>
-          <a:chOff x="0" y="0"/>
-          <a:chExt cx="0" cy="0"/>
-        </a:xfrm>
-      </p:grpSpPr>
-      <p:sp>
-        <p:nvSpPr>
-          <p:cNvPr id="36" name="Shape 36"/>
+      <p:sp>
+        <p:nvSpPr>
+          <p:cNvPr id="31" name="Shape 31"/>
           <p:cNvSpPr txBox="1">
             <a:spLocks noGrp="1"/>
           </p:cNvSpPr>
           <p:nvPr>
-            <p:ph type="title"/>
+            <p:ph type="subTitle" idx="1"/>
           </p:nvPr>
         </p:nvSpPr>
         <p:spPr>
           <a:xfrm>
-            <a:off x="457200" y="205978"/>
-            <a:ext cx="8229600" cy="857400"/>
-          </a:xfrm>
-          <a:prstGeom prst="rect">
-            <a:avLst/>
-          </a:prstGeom>
-        </p:spPr>
-        <p:txBody>
-          <a:bodyPr lIns="91425" tIns="91425" rIns="91425" bIns="91425" anchor="b" anchorCtr="0">
-            <a:noAutofit/>
-          </a:bodyPr>
-          <a:lstStyle/>
-          <a:p>
-            <a:pPr>
-              <a:spcBef>
-                <a:spcPts val="0"/>
-              </a:spcBef>
-              <a:buNone/>
-            </a:pPr>
-            <a:r>
-              <a:rPr lang="en"/>
-              <a:t>Agenda</a:t>
-            </a:r>
-          </a:p>
-        </p:txBody>
-      </p:sp>
-      <p:sp>
-        <p:nvSpPr>
-          <p:cNvPr id="37" name="Shape 37"/>
-          <p:cNvSpPr txBox="1">
-            <a:spLocks noGrp="1"/>
-          </p:cNvSpPr>
-          <p:nvPr>
-            <p:ph type="body" idx="1"/>
-          </p:nvPr>
-        </p:nvSpPr>
-        <p:spPr>
-          <a:xfrm>
-            <a:off x="457200" y="1200150"/>
-            <a:ext cx="8229600" cy="3725699"/>
+            <a:off x="685800" y="2840046"/>
+            <a:ext cx="7772400" cy="1634700"/>
           </a:xfrm>
           <a:prstGeom prst="rect">
             <a:avLst/>
@@ -7129,127 +7655,19 @@
           </a:bodyPr>
           <a:lstStyle/>
           <a:p>
-            <a:pPr marL="457200" lvl="0" indent="-419100" rtl="0">
-              <a:spcBef>
-                <a:spcPts val="0"/>
-              </a:spcBef>
-              <a:buClr>
-                <a:srgbClr val="000000"/>
-              </a:buClr>
-              <a:buSzPct val="100000"/>
-              <a:buFont typeface="Arial"/>
-              <a:buAutoNum type="arabicPeriod"/>
+            <a:pPr rtl="0">
+              <a:spcBef>
+                <a:spcPts val="0"/>
+              </a:spcBef>
+              <a:buNone/>
             </a:pPr>
             <a:r>
               <a:rPr lang="en" dirty="0"/>
-              <a:t>Who the heck is talking and why should I care</a:t>
+              <a:t>Christopher </a:t>
             </a:r>
             <a:r>
               <a:rPr lang="en" dirty="0" smtClean="0"/>
-              <a:t>?</a:t>
-            </a:r>
-          </a:p>
-          <a:p>
-            <a:pPr marL="457200" lvl="0" indent="-419100" rtl="0">
-              <a:spcBef>
-                <a:spcPts val="0"/>
-              </a:spcBef>
-              <a:buClr>
-                <a:srgbClr val="000000"/>
-              </a:buClr>
-              <a:buSzPct val="100000"/>
-              <a:buFont typeface="Arial"/>
-              <a:buAutoNum type="arabicPeriod"/>
-            </a:pPr>
-            <a:r>
-              <a:rPr lang="en" dirty="0" smtClean="0"/>
-              <a:t>Keywords</a:t>
-            </a:r>
-            <a:endParaRPr lang="en" dirty="0"/>
-          </a:p>
-          <a:p>
-            <a:pPr marL="457200" lvl="0" indent="-419100" rtl="0">
-              <a:spcBef>
-                <a:spcPts val="0"/>
-              </a:spcBef>
-              <a:buClr>
-                <a:srgbClr val="000000"/>
-              </a:buClr>
-              <a:buSzPct val="100000"/>
-              <a:buFont typeface="Arial"/>
-              <a:buAutoNum type="arabicPeriod"/>
-            </a:pPr>
-            <a:r>
-              <a:rPr lang="en" dirty="0"/>
-              <a:t>Basic explanation of Threading</a:t>
-            </a:r>
-          </a:p>
-          <a:p>
-            <a:pPr marL="457200" lvl="0" indent="-419100" rtl="0">
-              <a:spcBef>
-                <a:spcPts val="0"/>
-              </a:spcBef>
-              <a:buClr>
-                <a:srgbClr val="000000"/>
-              </a:buClr>
-              <a:buSzPct val="100000"/>
-              <a:buFont typeface="Arial"/>
-              <a:buAutoNum type="arabicPeriod"/>
-            </a:pPr>
-            <a:r>
-              <a:rPr lang="en" dirty="0"/>
-              <a:t>.NET 2.0</a:t>
-            </a:r>
-          </a:p>
-          <a:p>
-            <a:pPr marL="914400" lvl="1" indent="-381000" rtl="0">
-              <a:spcBef>
-                <a:spcPts val="0"/>
-              </a:spcBef>
-              <a:buClr>
-                <a:srgbClr val="000000"/>
-              </a:buClr>
-              <a:buSzPct val="80000"/>
-              <a:buFont typeface="Arial"/>
-              <a:buAutoNum type="alphaLcPeriod"/>
-            </a:pPr>
-            <a:r>
-              <a:rPr lang="en" dirty="0"/>
-              <a:t>How to make a Thread object</a:t>
-            </a:r>
-          </a:p>
-          <a:p>
-            <a:pPr marL="914400" lvl="1" indent="-381000" rtl="0">
-              <a:spcBef>
-                <a:spcPts val="0"/>
-              </a:spcBef>
-              <a:buClr>
-                <a:srgbClr val="000000"/>
-              </a:buClr>
-              <a:buSzPct val="80000"/>
-              <a:buFont typeface="Arial"/>
-              <a:buAutoNum type="alphaLcPeriod"/>
-            </a:pPr>
-            <a:r>
-              <a:rPr lang="en" dirty="0"/>
-              <a:t>How to kill a thread</a:t>
-            </a:r>
-          </a:p>
-          <a:p>
-            <a:pPr marL="914400" lvl="1" indent="-381000" rtl="0">
-              <a:spcBef>
-                <a:spcPts val="0"/>
-              </a:spcBef>
-              <a:buClr>
-                <a:srgbClr val="000000"/>
-              </a:buClr>
-              <a:buSzPct val="80000"/>
-              <a:buFont typeface="Arial"/>
-              <a:buAutoNum type="alphaLcPeriod"/>
-            </a:pPr>
-            <a:r>
-              <a:rPr lang="en" dirty="0" smtClean="0"/>
-              <a:t>Background Workers</a:t>
+              <a:t>Sippel</a:t>
             </a:r>
             <a:endParaRPr lang="en" dirty="0"/>
           </a:p>
@@ -7278,7 +7696,7 @@
   <p:cSld>
     <p:spTree>
       <p:nvGrpSpPr>
-        <p:cNvPr id="1" name="Shape 140"/>
+        <p:cNvPr id="1" name="Shape 134"/>
         <p:cNvGrpSpPr/>
         <p:nvPr/>
       </p:nvGrpSpPr>
@@ -7292,7 +7710,7 @@
       </p:grpSpPr>
       <p:sp>
         <p:nvSpPr>
-          <p:cNvPr id="141" name="Shape 141"/>
+          <p:cNvPr id="135" name="Shape 135"/>
           <p:cNvSpPr txBox="1">
             <a:spLocks noGrp="1"/>
           </p:cNvSpPr>
@@ -7323,14 +7741,14 @@
             </a:pPr>
             <a:r>
               <a:rPr lang="en"/>
-              <a:t>Async/Await - Return Values</a:t>
+              <a:t>Async/Await - Basic Sample</a:t>
             </a:r>
           </a:p>
         </p:txBody>
       </p:sp>
       <p:pic>
         <p:nvPicPr>
-          <p:cNvPr id="142" name="Shape 142"/>
+          <p:cNvPr id="136" name="Shape 136"/>
           <p:cNvPicPr preferRelativeResize="0"/>
           <p:nvPr/>
         </p:nvPicPr>
@@ -7345,7 +7763,7 @@
         <p:spPr>
           <a:xfrm>
             <a:off x="457200" y="1063375"/>
-            <a:ext cx="6038850" cy="3667125"/>
+            <a:ext cx="6124575" cy="3181350"/>
           </a:xfrm>
           <a:prstGeom prst="rect">
             <a:avLst/>
@@ -7379,7 +7797,7 @@
   <p:cSld>
     <p:spTree>
       <p:nvGrpSpPr>
-        <p:cNvPr id="1" name="Shape 146"/>
+        <p:cNvPr id="1" name="Shape 140"/>
         <p:cNvGrpSpPr/>
         <p:nvPr/>
       </p:nvGrpSpPr>
@@ -7393,7 +7811,7 @@
       </p:grpSpPr>
       <p:sp>
         <p:nvSpPr>
-          <p:cNvPr id="147" name="Shape 147"/>
+          <p:cNvPr id="141" name="Shape 141"/>
           <p:cNvSpPr txBox="1">
             <a:spLocks noGrp="1"/>
           </p:cNvSpPr>
@@ -7423,15 +7841,15 @@
               <a:buNone/>
             </a:pPr>
             <a:r>
-              <a:rPr lang="en" sz="2800"/>
-              <a:t>Async/Await - Synch method asynchronously</a:t>
+              <a:rPr lang="en"/>
+              <a:t>Async/Await - Return Values</a:t>
             </a:r>
           </a:p>
         </p:txBody>
       </p:sp>
       <p:pic>
         <p:nvPicPr>
-          <p:cNvPr id="148" name="Shape 148"/>
+          <p:cNvPr id="142" name="Shape 142"/>
           <p:cNvPicPr preferRelativeResize="0"/>
           <p:nvPr/>
         </p:nvPicPr>
@@ -7445,8 +7863,8 @@
         </p:blipFill>
         <p:spPr>
           <a:xfrm>
-            <a:off x="147625" y="1063375"/>
-            <a:ext cx="8848725" cy="3629025"/>
+            <a:off x="457200" y="1063375"/>
+            <a:ext cx="6038850" cy="3667125"/>
           </a:xfrm>
           <a:prstGeom prst="rect">
             <a:avLst/>
@@ -7480,6 +7898,107 @@
   <p:cSld>
     <p:spTree>
       <p:nvGrpSpPr>
+        <p:cNvPr id="1" name="Shape 146"/>
+        <p:cNvGrpSpPr/>
+        <p:nvPr/>
+      </p:nvGrpSpPr>
+      <p:grpSpPr>
+        <a:xfrm>
+          <a:off x="0" y="0"/>
+          <a:ext cx="0" cy="0"/>
+          <a:chOff x="0" y="0"/>
+          <a:chExt cx="0" cy="0"/>
+        </a:xfrm>
+      </p:grpSpPr>
+      <p:sp>
+        <p:nvSpPr>
+          <p:cNvPr id="147" name="Shape 147"/>
+          <p:cNvSpPr txBox="1">
+            <a:spLocks noGrp="1"/>
+          </p:cNvSpPr>
+          <p:nvPr>
+            <p:ph type="title"/>
+          </p:nvPr>
+        </p:nvSpPr>
+        <p:spPr>
+          <a:xfrm>
+            <a:off x="457200" y="205978"/>
+            <a:ext cx="8229600" cy="857400"/>
+          </a:xfrm>
+          <a:prstGeom prst="rect">
+            <a:avLst/>
+          </a:prstGeom>
+        </p:spPr>
+        <p:txBody>
+          <a:bodyPr lIns="91425" tIns="91425" rIns="91425" bIns="91425" anchor="b" anchorCtr="0">
+            <a:noAutofit/>
+          </a:bodyPr>
+          <a:lstStyle/>
+          <a:p>
+            <a:pPr>
+              <a:spcBef>
+                <a:spcPts val="0"/>
+              </a:spcBef>
+              <a:buNone/>
+            </a:pPr>
+            <a:r>
+              <a:rPr lang="en" sz="2800"/>
+              <a:t>Async/Await - Synch method asynchronously</a:t>
+            </a:r>
+          </a:p>
+        </p:txBody>
+      </p:sp>
+      <p:pic>
+        <p:nvPicPr>
+          <p:cNvPr id="148" name="Shape 148"/>
+          <p:cNvPicPr preferRelativeResize="0"/>
+          <p:nvPr/>
+        </p:nvPicPr>
+        <p:blipFill>
+          <a:blip r:embed="rId3">
+            <a:alphaModFix/>
+          </a:blip>
+          <a:stretch>
+            <a:fillRect/>
+          </a:stretch>
+        </p:blipFill>
+        <p:spPr>
+          <a:xfrm>
+            <a:off x="147625" y="1063375"/>
+            <a:ext cx="8848725" cy="3629025"/>
+          </a:xfrm>
+          <a:prstGeom prst="rect">
+            <a:avLst/>
+          </a:prstGeom>
+          <a:noFill/>
+          <a:ln>
+            <a:noFill/>
+          </a:ln>
+        </p:spPr>
+      </p:pic>
+    </p:spTree>
+  </p:cSld>
+  <p:clrMapOvr>
+    <a:masterClrMapping/>
+  </p:clrMapOvr>
+  <p:transition spd="slow">
+    <p:cut/>
+  </p:transition>
+  <p:timing>
+    <p:tnLst>
+      <p:par>
+        <p:cTn id="1" dur="indefinite" restart="never" nodeType="tmRoot"/>
+      </p:par>
+    </p:tnLst>
+  </p:timing>
+</p:sld>
+</file>
+
+<file path=ppt/slides/slide23.xml><?xml version="1.0" encoding="utf-8"?>
+<p:sld xmlns:a="http://schemas.openxmlformats.org/drawingml/2006/main" xmlns:r="http://schemas.openxmlformats.org/officeDocument/2006/relationships" xmlns:p="http://schemas.openxmlformats.org/presentationml/2006/main">
+  <p:cSld>
+    <p:spTree>
+      <p:nvGrpSpPr>
         <p:cNvPr id="1" name=""/>
         <p:cNvGrpSpPr/>
         <p:nvPr/>
@@ -7612,7 +8131,7 @@
 </p:sld>
 </file>
 
-<file path=ppt/slides/slide23.xml><?xml version="1.0" encoding="utf-8"?>
+<file path=ppt/slides/slide24.xml><?xml version="1.0" encoding="utf-8"?>
 <p:sld xmlns:a="http://schemas.openxmlformats.org/drawingml/2006/main" xmlns:r="http://schemas.openxmlformats.org/officeDocument/2006/relationships" xmlns:p="http://schemas.openxmlformats.org/presentationml/2006/main">
   <p:cSld>
     <p:spTree>
@@ -7813,137 +8332,6 @@
   <p:transition spd="slow">
     <p:cut/>
   </p:transition>
-  <p:timing>
-    <p:tnLst>
-      <p:par>
-        <p:cTn id="1" dur="indefinite" restart="never" nodeType="tmRoot"/>
-      </p:par>
-    </p:tnLst>
-  </p:timing>
-</p:sld>
-</file>
-
-<file path=ppt/slides/slide24.xml><?xml version="1.0" encoding="utf-8"?>
-<p:sld xmlns:a="http://schemas.openxmlformats.org/drawingml/2006/main" xmlns:r="http://schemas.openxmlformats.org/officeDocument/2006/relationships" xmlns:p="http://schemas.openxmlformats.org/presentationml/2006/main">
-  <p:cSld>
-    <p:spTree>
-      <p:nvGrpSpPr>
-        <p:cNvPr id="1" name=""/>
-        <p:cNvGrpSpPr/>
-        <p:nvPr/>
-      </p:nvGrpSpPr>
-      <p:grpSpPr>
-        <a:xfrm>
-          <a:off x="0" y="0"/>
-          <a:ext cx="0" cy="0"/>
-          <a:chOff x="0" y="0"/>
-          <a:chExt cx="0" cy="0"/>
-        </a:xfrm>
-      </p:grpSpPr>
-      <p:sp>
-        <p:nvSpPr>
-          <p:cNvPr id="2" name="Title 1"/>
-          <p:cNvSpPr>
-            <a:spLocks noGrp="1"/>
-          </p:cNvSpPr>
-          <p:nvPr>
-            <p:ph type="title"/>
-          </p:nvPr>
-        </p:nvSpPr>
-        <p:spPr/>
-        <p:txBody>
-          <a:bodyPr/>
-          <a:lstStyle/>
-          <a:p>
-            <a:r>
-              <a:rPr lang="en-CA" dirty="0" smtClean="0"/>
-              <a:t>Potential Exercises - Easy</a:t>
-            </a:r>
-            <a:endParaRPr lang="en-CA" dirty="0"/>
-          </a:p>
-        </p:txBody>
-      </p:sp>
-      <p:sp>
-        <p:nvSpPr>
-          <p:cNvPr id="3" name="Text Placeholder 2"/>
-          <p:cNvSpPr>
-            <a:spLocks noGrp="1"/>
-          </p:cNvSpPr>
-          <p:nvPr>
-            <p:ph type="body" idx="1"/>
-          </p:nvPr>
-        </p:nvSpPr>
-        <p:spPr/>
-        <p:txBody>
-          <a:bodyPr/>
-          <a:lstStyle/>
-          <a:p>
-            <a:r>
-              <a:rPr lang="en-CA" sz="2400" dirty="0" smtClean="0"/>
-              <a:t>Prime number retrieval</a:t>
-            </a:r>
-          </a:p>
-          <a:p>
-            <a:endParaRPr lang="en-CA" sz="2400" dirty="0" smtClean="0"/>
-          </a:p>
-          <a:p>
-            <a:r>
-              <a:rPr lang="en-CA" sz="2400" dirty="0" smtClean="0"/>
-              <a:t>Make a program that takes in pairs of numbers. Then get the prime numbers between each pair of numbers.</a:t>
-            </a:r>
-          </a:p>
-          <a:p>
-            <a:endParaRPr lang="en-CA" sz="2400" dirty="0" smtClean="0"/>
-          </a:p>
-          <a:p>
-            <a:r>
-              <a:rPr lang="en-CA" sz="2400" u="sng" dirty="0" smtClean="0"/>
-              <a:t>What  you learn</a:t>
-            </a:r>
-            <a:endParaRPr lang="en-CA" sz="2400" u="sng" dirty="0"/>
-          </a:p>
-          <a:p>
-            <a:pPr marL="342900" indent="-342900">
-              <a:buFont typeface="Arial" panose="020B0604020202020204" pitchFamily="34" charset="0"/>
-              <a:buChar char="•"/>
-            </a:pPr>
-            <a:r>
-              <a:rPr lang="en-CA" sz="2400" dirty="0" smtClean="0"/>
-              <a:t>How to spawn a thread</a:t>
-            </a:r>
-          </a:p>
-          <a:p>
-            <a:pPr marL="342900" indent="-342900">
-              <a:buFont typeface="Arial" panose="020B0604020202020204" pitchFamily="34" charset="0"/>
-              <a:buChar char="•"/>
-            </a:pPr>
-            <a:r>
-              <a:rPr lang="en-CA" sz="2400" dirty="0" smtClean="0"/>
-              <a:t>How to pass parameters to a task/thread</a:t>
-            </a:r>
-          </a:p>
-          <a:p>
-            <a:pPr marL="342900" indent="-342900">
-              <a:buFont typeface="Arial" panose="020B0604020202020204" pitchFamily="34" charset="0"/>
-              <a:buChar char="•"/>
-            </a:pPr>
-            <a:r>
-              <a:rPr lang="en-CA" sz="2400" dirty="0" smtClean="0"/>
-              <a:t>How to handle the return value(s) of a thread</a:t>
-            </a:r>
-          </a:p>
-        </p:txBody>
-      </p:sp>
-    </p:spTree>
-    <p:extLst>
-      <p:ext uri="{BB962C8B-B14F-4D97-AF65-F5344CB8AC3E}">
-        <p14:creationId xmlns:p14="http://schemas.microsoft.com/office/powerpoint/2010/main" val="298750098"/>
-      </p:ext>
-    </p:extLst>
-  </p:cSld>
-  <p:clrMapOvr>
-    <a:masterClrMapping/>
-  </p:clrMapOvr>
   <p:timing>
     <p:tnLst>
       <p:par>
@@ -7988,7 +8376,7 @@
           <a:p>
             <a:r>
               <a:rPr lang="en-CA" dirty="0" smtClean="0"/>
-              <a:t>Potential Exercises - Medium</a:t>
+              <a:t>Potential Exercises - Easy</a:t>
             </a:r>
             <a:endParaRPr lang="en-CA" dirty="0"/>
           </a:p>
@@ -8011,26 +8399,27 @@
           <a:p>
             <a:r>
               <a:rPr lang="en-CA" sz="2400" dirty="0" smtClean="0"/>
-              <a:t>Simple Web Browser</a:t>
-            </a:r>
-          </a:p>
-          <a:p>
-            <a:endParaRPr lang="en-CA" sz="2400" dirty="0"/>
+              <a:t>Prime number retrieval</a:t>
+            </a:r>
+          </a:p>
+          <a:p>
+            <a:endParaRPr lang="en-CA" sz="2400" dirty="0" smtClean="0"/>
           </a:p>
           <a:p>
             <a:r>
               <a:rPr lang="en-CA" sz="2400" dirty="0" smtClean="0"/>
-              <a:t>Create a simple web browser with a go and cancel button as a minimum</a:t>
-            </a:r>
-          </a:p>
-          <a:p>
-            <a:endParaRPr lang="en-CA" sz="2400" dirty="0"/>
+              <a:t>Make a program that takes in pairs of numbers. Then get the prime numbers between each pair of numbers.</a:t>
+            </a:r>
+          </a:p>
+          <a:p>
+            <a:endParaRPr lang="en-CA" sz="2400" dirty="0" smtClean="0"/>
           </a:p>
           <a:p>
             <a:r>
               <a:rPr lang="en-CA" sz="2400" u="sng" dirty="0" smtClean="0"/>
-              <a:t>What you learn</a:t>
-            </a:r>
+              <a:t>What  you learn</a:t>
+            </a:r>
+            <a:endParaRPr lang="en-CA" sz="2400" u="sng" dirty="0"/>
           </a:p>
           <a:p>
             <a:pPr marL="342900" indent="-342900">
@@ -8039,23 +8428,7 @@
             </a:pPr>
             <a:r>
               <a:rPr lang="en-CA" sz="2400" dirty="0" smtClean="0"/>
-              <a:t>How to use a .NET </a:t>
-            </a:r>
-            <a:r>
-              <a:rPr lang="en-CA" sz="2400" dirty="0" err="1" smtClean="0"/>
-              <a:t>Async</a:t>
-            </a:r>
-            <a:r>
-              <a:rPr lang="en-CA" sz="2400" dirty="0" smtClean="0"/>
-              <a:t> method, </a:t>
-            </a:r>
-            <a:r>
-              <a:rPr lang="en-CA" sz="2400" dirty="0" err="1" smtClean="0"/>
-              <a:t>WebClient</a:t>
-            </a:r>
-            <a:r>
-              <a:rPr lang="en-CA" sz="2400" dirty="0" smtClean="0"/>
-              <a:t> object</a:t>
+              <a:t>How to spawn a thread</a:t>
             </a:r>
           </a:p>
           <a:p>
@@ -8065,7 +8438,7 @@
             </a:pPr>
             <a:r>
               <a:rPr lang="en-CA" sz="2400" dirty="0" smtClean="0"/>
-              <a:t>How to tell the user something is happening</a:t>
+              <a:t>How to pass parameters to a task/thread</a:t>
             </a:r>
           </a:p>
           <a:p>
@@ -8075,7 +8448,7 @@
             </a:pPr>
             <a:r>
               <a:rPr lang="en-CA" sz="2400" dirty="0" smtClean="0"/>
-              <a:t>How to cancel a task/thread</a:t>
+              <a:t>How to handle the return value(s) of a thread</a:t>
             </a:r>
           </a:p>
         </p:txBody>
@@ -8083,7 +8456,7 @@
     </p:spTree>
     <p:extLst>
       <p:ext uri="{BB962C8B-B14F-4D97-AF65-F5344CB8AC3E}">
-        <p14:creationId xmlns:p14="http://schemas.microsoft.com/office/powerpoint/2010/main" val="1390087406"/>
+        <p14:creationId xmlns:p14="http://schemas.microsoft.com/office/powerpoint/2010/main" val="298750098"/>
       </p:ext>
     </p:extLst>
   </p:cSld>
@@ -8134,7 +8507,7 @@
           <a:p>
             <a:r>
               <a:rPr lang="en-CA" dirty="0" smtClean="0"/>
-              <a:t>Potential Exercise - Hard</a:t>
+              <a:t>Potential Exercises - Medium</a:t>
             </a:r>
             <a:endParaRPr lang="en-CA" dirty="0"/>
           </a:p>
@@ -8157,6 +8530,152 @@
           <a:p>
             <a:r>
               <a:rPr lang="en-CA" sz="2400" dirty="0" smtClean="0"/>
+              <a:t>Simple Web Browser</a:t>
+            </a:r>
+          </a:p>
+          <a:p>
+            <a:endParaRPr lang="en-CA" sz="2400" dirty="0"/>
+          </a:p>
+          <a:p>
+            <a:r>
+              <a:rPr lang="en-CA" sz="2400" dirty="0" smtClean="0"/>
+              <a:t>Create a simple web browser with a go and cancel button as a minimum</a:t>
+            </a:r>
+          </a:p>
+          <a:p>
+            <a:endParaRPr lang="en-CA" sz="2400" dirty="0"/>
+          </a:p>
+          <a:p>
+            <a:r>
+              <a:rPr lang="en-CA" sz="2400" u="sng" dirty="0" smtClean="0"/>
+              <a:t>What you learn</a:t>
+            </a:r>
+          </a:p>
+          <a:p>
+            <a:pPr marL="342900" indent="-342900">
+              <a:buFont typeface="Arial" panose="020B0604020202020204" pitchFamily="34" charset="0"/>
+              <a:buChar char="•"/>
+            </a:pPr>
+            <a:r>
+              <a:rPr lang="en-CA" sz="2400" dirty="0" smtClean="0"/>
+              <a:t>How to use a .NET </a:t>
+            </a:r>
+            <a:r>
+              <a:rPr lang="en-CA" sz="2400" dirty="0" err="1" smtClean="0"/>
+              <a:t>Async</a:t>
+            </a:r>
+            <a:r>
+              <a:rPr lang="en-CA" sz="2400" dirty="0" smtClean="0"/>
+              <a:t> method, </a:t>
+            </a:r>
+            <a:r>
+              <a:rPr lang="en-CA" sz="2400" dirty="0" err="1" smtClean="0"/>
+              <a:t>WebClient</a:t>
+            </a:r>
+            <a:r>
+              <a:rPr lang="en-CA" sz="2400" dirty="0" smtClean="0"/>
+              <a:t> object</a:t>
+            </a:r>
+          </a:p>
+          <a:p>
+            <a:pPr marL="342900" indent="-342900">
+              <a:buFont typeface="Arial" panose="020B0604020202020204" pitchFamily="34" charset="0"/>
+              <a:buChar char="•"/>
+            </a:pPr>
+            <a:r>
+              <a:rPr lang="en-CA" sz="2400" dirty="0" smtClean="0"/>
+              <a:t>How to tell the user something is happening</a:t>
+            </a:r>
+          </a:p>
+          <a:p>
+            <a:pPr marL="342900" indent="-342900">
+              <a:buFont typeface="Arial" panose="020B0604020202020204" pitchFamily="34" charset="0"/>
+              <a:buChar char="•"/>
+            </a:pPr>
+            <a:r>
+              <a:rPr lang="en-CA" sz="2400" dirty="0" smtClean="0"/>
+              <a:t>How to cancel a task/thread</a:t>
+            </a:r>
+          </a:p>
+        </p:txBody>
+      </p:sp>
+    </p:spTree>
+    <p:extLst>
+      <p:ext uri="{BB962C8B-B14F-4D97-AF65-F5344CB8AC3E}">
+        <p14:creationId xmlns:p14="http://schemas.microsoft.com/office/powerpoint/2010/main" val="1390087406"/>
+      </p:ext>
+    </p:extLst>
+  </p:cSld>
+  <p:clrMapOvr>
+    <a:masterClrMapping/>
+  </p:clrMapOvr>
+  <p:timing>
+    <p:tnLst>
+      <p:par>
+        <p:cTn id="1" dur="indefinite" restart="never" nodeType="tmRoot"/>
+      </p:par>
+    </p:tnLst>
+  </p:timing>
+</p:sld>
+</file>
+
+<file path=ppt/slides/slide27.xml><?xml version="1.0" encoding="utf-8"?>
+<p:sld xmlns:a="http://schemas.openxmlformats.org/drawingml/2006/main" xmlns:r="http://schemas.openxmlformats.org/officeDocument/2006/relationships" xmlns:p="http://schemas.openxmlformats.org/presentationml/2006/main">
+  <p:cSld>
+    <p:spTree>
+      <p:nvGrpSpPr>
+        <p:cNvPr id="1" name=""/>
+        <p:cNvGrpSpPr/>
+        <p:nvPr/>
+      </p:nvGrpSpPr>
+      <p:grpSpPr>
+        <a:xfrm>
+          <a:off x="0" y="0"/>
+          <a:ext cx="0" cy="0"/>
+          <a:chOff x="0" y="0"/>
+          <a:chExt cx="0" cy="0"/>
+        </a:xfrm>
+      </p:grpSpPr>
+      <p:sp>
+        <p:nvSpPr>
+          <p:cNvPr id="2" name="Title 1"/>
+          <p:cNvSpPr>
+            <a:spLocks noGrp="1"/>
+          </p:cNvSpPr>
+          <p:nvPr>
+            <p:ph type="title"/>
+          </p:nvPr>
+        </p:nvSpPr>
+        <p:spPr/>
+        <p:txBody>
+          <a:bodyPr/>
+          <a:lstStyle/>
+          <a:p>
+            <a:r>
+              <a:rPr lang="en-CA" dirty="0" smtClean="0"/>
+              <a:t>Potential Exercise - Hard</a:t>
+            </a:r>
+            <a:endParaRPr lang="en-CA" dirty="0"/>
+          </a:p>
+        </p:txBody>
+      </p:sp>
+      <p:sp>
+        <p:nvSpPr>
+          <p:cNvPr id="3" name="Text Placeholder 2"/>
+          <p:cNvSpPr>
+            <a:spLocks noGrp="1"/>
+          </p:cNvSpPr>
+          <p:nvPr>
+            <p:ph type="body" idx="1"/>
+          </p:nvPr>
+        </p:nvSpPr>
+        <p:spPr/>
+        <p:txBody>
+          <a:bodyPr/>
+          <a:lstStyle/>
+          <a:p>
+            <a:r>
+              <a:rPr lang="en-CA" sz="2400" dirty="0" smtClean="0"/>
               <a:t>Simple Chat Client</a:t>
             </a:r>
           </a:p>
@@ -8196,6 +8715,347 @@
     <p:extLst>
       <p:ext uri="{BB962C8B-B14F-4D97-AF65-F5344CB8AC3E}">
         <p14:creationId xmlns:p14="http://schemas.microsoft.com/office/powerpoint/2010/main" val="2746473369"/>
+      </p:ext>
+    </p:extLst>
+  </p:cSld>
+  <p:clrMapOvr>
+    <a:masterClrMapping/>
+  </p:clrMapOvr>
+  <p:timing>
+    <p:tnLst>
+      <p:par>
+        <p:cTn id="1" dur="indefinite" restart="never" nodeType="tmRoot"/>
+      </p:par>
+    </p:tnLst>
+  </p:timing>
+</p:sld>
+</file>
+
+<file path=ppt/slides/slide28.xml><?xml version="1.0" encoding="utf-8"?>
+<p:sld xmlns:a="http://schemas.openxmlformats.org/drawingml/2006/main" xmlns:r="http://schemas.openxmlformats.org/officeDocument/2006/relationships" xmlns:p="http://schemas.openxmlformats.org/presentationml/2006/main">
+  <p:cSld>
+    <p:spTree>
+      <p:nvGrpSpPr>
+        <p:cNvPr id="1" name=""/>
+        <p:cNvGrpSpPr/>
+        <p:nvPr/>
+      </p:nvGrpSpPr>
+      <p:grpSpPr>
+        <a:xfrm>
+          <a:off x="0" y="0"/>
+          <a:ext cx="0" cy="0"/>
+          <a:chOff x="0" y="0"/>
+          <a:chExt cx="0" cy="0"/>
+        </a:xfrm>
+      </p:grpSpPr>
+      <p:pic>
+        <p:nvPicPr>
+          <p:cNvPr id="6" name="Picture 5" descr="Magnet Forensics background_1200px_1.jpg"/>
+          <p:cNvPicPr>
+            <a:picLocks noChangeAspect="1"/>
+          </p:cNvPicPr>
+          <p:nvPr/>
+        </p:nvPicPr>
+        <p:blipFill>
+          <a:blip r:embed="rId3">
+            <a:extLst>
+              <a:ext uri="{28A0092B-C50C-407E-A947-70E740481C1C}">
+                <a14:useLocalDpi xmlns:a14="http://schemas.microsoft.com/office/drawing/2010/main" val="0"/>
+              </a:ext>
+            </a:extLst>
+          </a:blip>
+          <a:stretch>
+            <a:fillRect/>
+          </a:stretch>
+        </p:blipFill>
+        <p:spPr>
+          <a:xfrm>
+            <a:off x="0" y="0"/>
+            <a:ext cx="9144000" cy="5143500"/>
+          </a:xfrm>
+          <a:prstGeom prst="rect">
+            <a:avLst/>
+          </a:prstGeom>
+        </p:spPr>
+      </p:pic>
+      <p:sp>
+        <p:nvSpPr>
+          <p:cNvPr id="5" name="TextBox 4"/>
+          <p:cNvSpPr txBox="1"/>
+          <p:nvPr/>
+        </p:nvSpPr>
+        <p:spPr>
+          <a:xfrm>
+            <a:off x="7315200" y="4629150"/>
+            <a:ext cx="1066800" cy="338554"/>
+          </a:xfrm>
+          <a:prstGeom prst="rect">
+            <a:avLst/>
+          </a:prstGeom>
+          <a:noFill/>
+        </p:spPr>
+        <p:txBody>
+          <a:bodyPr wrap="square" rtlCol="0">
+            <a:spAutoFit/>
+          </a:bodyPr>
+          <a:lstStyle/>
+          <a:p>
+            <a:r>
+              <a:rPr lang="en-US" sz="1600" dirty="0" smtClean="0">
+                <a:solidFill>
+                  <a:schemeClr val="bg1"/>
+                </a:solidFill>
+              </a:rPr>
+              <a:t>Hosted by</a:t>
+            </a:r>
+            <a:endParaRPr lang="en-US" sz="1600" dirty="0">
+              <a:solidFill>
+                <a:schemeClr val="bg1"/>
+              </a:solidFill>
+            </a:endParaRPr>
+          </a:p>
+        </p:txBody>
+      </p:sp>
+      <p:sp>
+        <p:nvSpPr>
+          <p:cNvPr id="7" name="TextBox 6"/>
+          <p:cNvSpPr txBox="1"/>
+          <p:nvPr/>
+        </p:nvSpPr>
+        <p:spPr>
+          <a:xfrm>
+            <a:off x="888941" y="1504950"/>
+            <a:ext cx="7520007" cy="1446550"/>
+          </a:xfrm>
+          <a:prstGeom prst="rect">
+            <a:avLst/>
+          </a:prstGeom>
+          <a:noFill/>
+        </p:spPr>
+        <p:txBody>
+          <a:bodyPr wrap="none" rtlCol="0">
+            <a:spAutoFit/>
+          </a:bodyPr>
+          <a:lstStyle/>
+          <a:p>
+            <a:r>
+              <a:rPr lang="en-US" sz="6600" dirty="0" smtClean="0">
+                <a:solidFill>
+                  <a:schemeClr val="bg1"/>
+                </a:solidFill>
+                <a:latin typeface="Avenir Black"/>
+                <a:cs typeface="Avenir Black"/>
+              </a:rPr>
+              <a:t>C#</a:t>
+            </a:r>
+            <a:r>
+              <a:rPr lang="en-US" sz="6600" dirty="0" smtClean="0"/>
+              <a:t> </a:t>
+            </a:r>
+            <a:r>
+              <a:rPr lang="en-US" sz="6600" dirty="0" smtClean="0">
+                <a:solidFill>
+                  <a:srgbClr val="3983C8"/>
+                </a:solidFill>
+                <a:latin typeface="Helvetica Neue Thin"/>
+                <a:cs typeface="Helvetica Neue Thin"/>
+              </a:rPr>
+              <a:t>DEV</a:t>
+            </a:r>
+            <a:r>
+              <a:rPr lang="en-US" sz="8800" b="1" dirty="0" smtClean="0">
+                <a:solidFill>
+                  <a:srgbClr val="FFFFFF"/>
+                </a:solidFill>
+              </a:rPr>
+              <a:t>/</a:t>
+            </a:r>
+            <a:r>
+              <a:rPr lang="en-US" sz="6600" dirty="0" smtClean="0">
+                <a:solidFill>
+                  <a:srgbClr val="3983C8"/>
+                </a:solidFill>
+                <a:latin typeface="Helvetica Neue Thin"/>
+                <a:cs typeface="Helvetica Neue Thin"/>
+              </a:rPr>
+              <a:t>CONNECT</a:t>
+            </a:r>
+            <a:endParaRPr lang="en-US" sz="6600" dirty="0">
+              <a:solidFill>
+                <a:srgbClr val="3983C8"/>
+              </a:solidFill>
+              <a:latin typeface="Helvetica Neue Thin"/>
+              <a:cs typeface="Helvetica Neue Thin"/>
+            </a:endParaRPr>
+          </a:p>
+        </p:txBody>
+      </p:sp>
+      <p:pic>
+        <p:nvPicPr>
+          <p:cNvPr id="8" name="Picture 7" descr="Magnet M Logo.png"/>
+          <p:cNvPicPr>
+            <a:picLocks noChangeAspect="1"/>
+          </p:cNvPicPr>
+          <p:nvPr/>
+        </p:nvPicPr>
+        <p:blipFill>
+          <a:blip r:embed="rId4">
+            <a:extLst>
+              <a:ext uri="{28A0092B-C50C-407E-A947-70E740481C1C}">
+                <a14:useLocalDpi xmlns:a14="http://schemas.microsoft.com/office/drawing/2010/main" val="0"/>
+              </a:ext>
+            </a:extLst>
+          </a:blip>
+          <a:stretch>
+            <a:fillRect/>
+          </a:stretch>
+        </p:blipFill>
+        <p:spPr>
+          <a:xfrm>
+            <a:off x="8305800" y="4400550"/>
+            <a:ext cx="650403" cy="590550"/>
+          </a:xfrm>
+          <a:prstGeom prst="rect">
+            <a:avLst/>
+          </a:prstGeom>
+        </p:spPr>
+      </p:pic>
+      <p:sp>
+        <p:nvSpPr>
+          <p:cNvPr id="9" name="TextBox 8"/>
+          <p:cNvSpPr txBox="1"/>
+          <p:nvPr/>
+        </p:nvSpPr>
+        <p:spPr>
+          <a:xfrm>
+            <a:off x="990600" y="3028950"/>
+            <a:ext cx="6324600" cy="1421928"/>
+          </a:xfrm>
+          <a:prstGeom prst="rect">
+            <a:avLst/>
+          </a:prstGeom>
+          <a:noFill/>
+        </p:spPr>
+        <p:txBody>
+          <a:bodyPr wrap="square" rtlCol="0">
+            <a:spAutoFit/>
+          </a:bodyPr>
+          <a:lstStyle/>
+          <a:p>
+            <a:pPr>
+              <a:lnSpc>
+                <a:spcPct val="120000"/>
+              </a:lnSpc>
+            </a:pPr>
+            <a:r>
+              <a:rPr lang="en-US" sz="2400" dirty="0" smtClean="0">
+                <a:solidFill>
+                  <a:srgbClr val="FFFFFF"/>
+                </a:solidFill>
+              </a:rPr>
+              <a:t>Twitter: @</a:t>
+            </a:r>
+            <a:r>
+              <a:rPr lang="en-US" sz="2400" dirty="0" err="1" smtClean="0">
+                <a:solidFill>
+                  <a:srgbClr val="FFFFFF"/>
+                </a:solidFill>
+              </a:rPr>
+              <a:t>CSDevConnect</a:t>
+            </a:r>
+            <a:r>
+              <a:rPr lang="en-US" sz="2400" dirty="0">
+                <a:solidFill>
+                  <a:srgbClr val="FFFFFF"/>
+                </a:solidFill>
+              </a:rPr>
+              <a:t> </a:t>
+            </a:r>
+            <a:r>
+              <a:rPr lang="en-US" sz="2400" dirty="0" smtClean="0">
+                <a:solidFill>
+                  <a:srgbClr val="FFFFFF"/>
+                </a:solidFill>
+              </a:rPr>
+              <a:t>#</a:t>
+            </a:r>
+            <a:r>
+              <a:rPr lang="en-US" sz="2400" dirty="0" err="1" smtClean="0">
+                <a:solidFill>
+                  <a:srgbClr val="FFFFFF"/>
+                </a:solidFill>
+              </a:rPr>
+              <a:t>CSDevConnect</a:t>
+            </a:r>
+            <a:endParaRPr lang="en-US" sz="2400" dirty="0" smtClean="0">
+              <a:solidFill>
+                <a:srgbClr val="FFFFFF"/>
+              </a:solidFill>
+            </a:endParaRPr>
+          </a:p>
+          <a:p>
+            <a:pPr>
+              <a:lnSpc>
+                <a:spcPct val="120000"/>
+              </a:lnSpc>
+            </a:pPr>
+            <a:r>
+              <a:rPr lang="en-US" sz="2400" dirty="0" smtClean="0">
+                <a:solidFill>
+                  <a:srgbClr val="FFFFFF"/>
+                </a:solidFill>
+              </a:rPr>
+              <a:t>Email: </a:t>
+            </a:r>
+            <a:r>
+              <a:rPr lang="en-US" sz="2400" dirty="0" smtClean="0">
+                <a:solidFill>
+                  <a:srgbClr val="FFFFFF"/>
+                </a:solidFill>
+                <a:hlinkClick r:id="rId5"/>
+              </a:rPr>
+              <a:t>csharpdevconnect@gmail.com</a:t>
+            </a:r>
+            <a:endParaRPr lang="en-US" sz="2400" dirty="0" smtClean="0">
+              <a:solidFill>
+                <a:srgbClr val="FFFFFF"/>
+              </a:solidFill>
+            </a:endParaRPr>
+          </a:p>
+          <a:p>
+            <a:pPr>
+              <a:lnSpc>
+                <a:spcPct val="120000"/>
+              </a:lnSpc>
+            </a:pPr>
+            <a:r>
+              <a:rPr lang="en-US" sz="2400" dirty="0" err="1" smtClean="0">
+                <a:solidFill>
+                  <a:srgbClr val="FFFFFF"/>
+                </a:solidFill>
+              </a:rPr>
+              <a:t>Github</a:t>
+            </a:r>
+            <a:r>
+              <a:rPr lang="en-US" sz="2400" dirty="0">
+                <a:solidFill>
+                  <a:srgbClr val="FFFFFF"/>
+                </a:solidFill>
+              </a:rPr>
+              <a:t>: https://github.com/CSharpDevConnect/</a:t>
+            </a:r>
+            <a:endParaRPr lang="en-US" sz="2400" dirty="0" smtClean="0">
+              <a:solidFill>
+                <a:srgbClr val="FFFFFF"/>
+              </a:solidFill>
+            </a:endParaRPr>
+          </a:p>
+        </p:txBody>
+      </p:sp>
+    </p:spTree>
+    <p:extLst>
+      <p:ext uri="{BB962C8B-B14F-4D97-AF65-F5344CB8AC3E}">
+        <p14:creationId xmlns:p14="http://schemas.microsoft.com/office/powerpoint/2010/main" val="2223295814"/>
       </p:ext>
     </p:extLst>
   </p:cSld>
@@ -8217,7 +9077,7 @@
   <p:cSld>
     <p:spTree>
       <p:nvGrpSpPr>
-        <p:cNvPr id="1" name="Shape 41"/>
+        <p:cNvPr id="1" name="Shape 35"/>
         <p:cNvGrpSpPr/>
         <p:nvPr/>
       </p:nvGrpSpPr>
@@ -8231,7 +9091,7 @@
       </p:grpSpPr>
       <p:sp>
         <p:nvSpPr>
-          <p:cNvPr id="42" name="Shape 42"/>
+          <p:cNvPr id="36" name="Shape 36"/>
           <p:cNvSpPr txBox="1">
             <a:spLocks noGrp="1"/>
           </p:cNvSpPr>
@@ -8262,14 +9122,14 @@
             </a:pPr>
             <a:r>
               <a:rPr lang="en"/>
-              <a:t>Cont.</a:t>
+              <a:t>Agenda</a:t>
             </a:r>
           </a:p>
         </p:txBody>
       </p:sp>
       <p:sp>
         <p:nvSpPr>
-          <p:cNvPr id="43" name="Shape 43"/>
+          <p:cNvPr id="37" name="Shape 37"/>
           <p:cNvSpPr txBox="1">
             <a:spLocks noGrp="1"/>
           </p:cNvSpPr>
@@ -8305,7 +9165,63 @@
             </a:pPr>
             <a:r>
               <a:rPr lang="en" dirty="0"/>
-              <a:t>.NET 4.5</a:t>
+              <a:t>Who the heck is talking and why should I care</a:t>
+            </a:r>
+            <a:r>
+              <a:rPr lang="en" dirty="0" smtClean="0"/>
+              <a:t>?</a:t>
+            </a:r>
+          </a:p>
+          <a:p>
+            <a:pPr marL="457200" lvl="0" indent="-419100" rtl="0">
+              <a:spcBef>
+                <a:spcPts val="0"/>
+              </a:spcBef>
+              <a:buClr>
+                <a:srgbClr val="000000"/>
+              </a:buClr>
+              <a:buSzPct val="100000"/>
+              <a:buFont typeface="Arial"/>
+              <a:buAutoNum type="arabicPeriod"/>
+            </a:pPr>
+            <a:r>
+              <a:rPr lang="en" dirty="0" smtClean="0"/>
+              <a:t>Keywords</a:t>
+            </a:r>
+            <a:endParaRPr lang="en" dirty="0"/>
+          </a:p>
+          <a:p>
+            <a:pPr marL="457200" lvl="0" indent="-419100" rtl="0">
+              <a:spcBef>
+                <a:spcPts val="0"/>
+              </a:spcBef>
+              <a:buClr>
+                <a:srgbClr val="000000"/>
+              </a:buClr>
+              <a:buSzPct val="100000"/>
+              <a:buFont typeface="Arial"/>
+              <a:buAutoNum type="arabicPeriod"/>
+            </a:pPr>
+            <a:r>
+              <a:rPr lang="en" dirty="0"/>
+              <a:t>Basic explanation of Threading</a:t>
+            </a:r>
+          </a:p>
+          <a:p>
+            <a:pPr marL="457200" lvl="0" indent="-419100" rtl="0">
+              <a:spcBef>
+                <a:spcPts val="0"/>
+              </a:spcBef>
+              <a:buClr>
+                <a:srgbClr val="000000"/>
+              </a:buClr>
+              <a:buSzPct val="100000"/>
+              <a:buFont typeface="Arial"/>
+              <a:buAutoNum type="arabicPeriod"/>
+            </a:pPr>
+            <a:r>
+              <a:rPr lang="en" dirty="0"/>
+              <a:t>.NET 2.0</a:t>
             </a:r>
           </a:p>
           <a:p>
@@ -8322,7 +9238,7 @@
             </a:pPr>
             <a:r>
               <a:rPr lang="en" dirty="0"/>
-              <a:t>Async/Await</a:t>
+              <a:t>How to make a Thread object</a:t>
             </a:r>
           </a:p>
           <a:p>
@@ -8338,42 +9254,25 @@
               <a:buAutoNum type="alphaLcPeriod"/>
             </a:pPr>
             <a:r>
-              <a:rPr lang="en" dirty="0" smtClean="0"/>
-              <a:t>Tasks</a:t>
-            </a:r>
-          </a:p>
-          <a:p>
-            <a:pPr marL="457200" lvl="0" indent="-419100" rtl="0">
+              <a:rPr lang="en" dirty="0"/>
+              <a:t>How to kill a thread</a:t>
+            </a:r>
+          </a:p>
+          <a:p>
+            <a:pPr marL="914400" lvl="1" indent="-381000" rtl="0">
               <a:spcBef>
                 <a:spcPts val="0"/>
               </a:spcBef>
               <a:buClr>
                 <a:srgbClr val="000000"/>
               </a:buClr>
-              <a:buSzPct val="100000"/>
+              <a:buSzPct val="80000"/>
               <a:buFont typeface="Arial"/>
-              <a:buAutoNum type="arabicPeriod"/>
+              <a:buAutoNum type="alphaLcPeriod"/>
             </a:pPr>
             <a:r>
               <a:rPr lang="en" dirty="0" smtClean="0"/>
-              <a:t>Questions</a:t>
-            </a:r>
-          </a:p>
-          <a:p>
-            <a:pPr marL="457200" lvl="0" indent="-419100" rtl="0">
-              <a:spcBef>
-                <a:spcPts val="0"/>
-              </a:spcBef>
-              <a:buClr>
-                <a:srgbClr val="000000"/>
-              </a:buClr>
-              <a:buSzPct val="100000"/>
-              <a:buFont typeface="Arial"/>
-              <a:buAutoNum type="arabicPeriod"/>
-            </a:pPr>
-            <a:r>
-              <a:rPr lang="en" dirty="0" smtClean="0"/>
-              <a:t>Potential Exercises</a:t>
+              <a:t>Background Workers</a:t>
             </a:r>
             <a:endParaRPr lang="en" dirty="0"/>
           </a:p>
@@ -8402,7 +9301,7 @@
   <p:cSld>
     <p:spTree>
       <p:nvGrpSpPr>
-        <p:cNvPr id="1" name="Shape 47"/>
+        <p:cNvPr id="1" name="Shape 41"/>
         <p:cNvGrpSpPr/>
         <p:nvPr/>
       </p:nvGrpSpPr>
@@ -8416,7 +9315,7 @@
       </p:grpSpPr>
       <p:sp>
         <p:nvSpPr>
-          <p:cNvPr id="48" name="Shape 48"/>
+          <p:cNvPr id="42" name="Shape 42"/>
           <p:cNvSpPr txBox="1">
             <a:spLocks noGrp="1"/>
           </p:cNvSpPr>
@@ -8447,14 +9346,14 @@
             </a:pPr>
             <a:r>
               <a:rPr lang="en"/>
-              <a:t>Who the heck is this guy?</a:t>
+              <a:t>Cont.</a:t>
             </a:r>
           </a:p>
         </p:txBody>
       </p:sp>
       <p:sp>
         <p:nvSpPr>
-          <p:cNvPr id="49" name="Shape 49"/>
+          <p:cNvPr id="43" name="Shape 43"/>
           <p:cNvSpPr txBox="1">
             <a:spLocks noGrp="1"/>
           </p:cNvSpPr>
@@ -8477,166 +9376,90 @@
           </a:bodyPr>
           <a:lstStyle/>
           <a:p>
-            <a:pPr algn="ctr" rtl="0">
-              <a:spcBef>
-                <a:spcPts val="0"/>
-              </a:spcBef>
-              <a:buNone/>
-            </a:pPr>
-            <a:r>
-              <a:rPr lang="en" sz="2000" dirty="0"/>
-              <a:t>Chris Sippel</a:t>
-            </a:r>
-          </a:p>
-          <a:p>
-            <a:pPr algn="ctr" rtl="0">
-              <a:spcBef>
-                <a:spcPts val="0"/>
-              </a:spcBef>
-              <a:buNone/>
-            </a:pPr>
-            <a:r>
-              <a:rPr lang="en" sz="2000" dirty="0"/>
-              <a:t>Developing software for 9 years</a:t>
-            </a:r>
-          </a:p>
-          <a:p>
-            <a:pPr algn="ctr" rtl="0">
-              <a:spcBef>
-                <a:spcPts val="0"/>
-              </a:spcBef>
-              <a:buNone/>
-            </a:pPr>
-            <a:r>
-              <a:rPr lang="en" sz="2000" dirty="0"/>
-              <a:t>Graduated from Conestoga College in 2014</a:t>
-            </a:r>
-          </a:p>
-          <a:p>
-            <a:pPr algn="ctr" rtl="0">
-              <a:spcBef>
-                <a:spcPts val="0"/>
-              </a:spcBef>
-              <a:buNone/>
-            </a:pPr>
-            <a:r>
-              <a:rPr lang="en" sz="2000" dirty="0"/>
-              <a:t>Has 8 apps on the Windows </a:t>
-            </a:r>
-            <a:r>
-              <a:rPr lang="en" sz="2000" dirty="0" smtClean="0"/>
-              <a:t>Phone Market Place </a:t>
-            </a:r>
-            <a:r>
-              <a:rPr lang="en" sz="2000" dirty="0"/>
-              <a:t>with </a:t>
-            </a:r>
-            <a:r>
-              <a:rPr lang="en" sz="2000" dirty="0" smtClean="0"/>
-              <a:t>a </a:t>
-            </a:r>
-            <a:r>
-              <a:rPr lang="en" sz="2000" dirty="0"/>
-              <a:t>total of 11,000 downloads</a:t>
-            </a:r>
-          </a:p>
-          <a:p>
-            <a:pPr algn="ctr" rtl="0">
-              <a:spcBef>
-                <a:spcPts val="0"/>
-              </a:spcBef>
-              <a:buNone/>
-            </a:pPr>
-            <a:endParaRPr sz="2000" dirty="0"/>
-          </a:p>
-          <a:p>
-            <a:pPr algn="ctr" rtl="0">
-              <a:spcBef>
-                <a:spcPts val="0"/>
-              </a:spcBef>
-              <a:buNone/>
-            </a:pPr>
-            <a:r>
-              <a:rPr lang="en" sz="2000" dirty="0"/>
-              <a:t>LinkedIn: </a:t>
-            </a:r>
-            <a:r>
-              <a:rPr lang="en" sz="2000" u="sng" dirty="0">
-                <a:solidFill>
-                  <a:schemeClr val="hlink"/>
-                </a:solidFill>
-                <a:hlinkClick r:id="rId3"/>
-              </a:rPr>
-              <a:t>https://www.linkedin.com/in/chrissippel</a:t>
-            </a:r>
-          </a:p>
-          <a:p>
-            <a:pPr algn="ctr" rtl="0">
-              <a:spcBef>
-                <a:spcPts val="0"/>
-              </a:spcBef>
-              <a:buNone/>
-            </a:pPr>
-            <a:r>
-              <a:rPr lang="en" sz="2000" dirty="0"/>
-              <a:t>Twitter: @Chris_Sippel</a:t>
-            </a:r>
-          </a:p>
-          <a:p>
-            <a:pPr algn="ctr" rtl="0">
-              <a:spcBef>
-                <a:spcPts val="0"/>
-              </a:spcBef>
-              <a:buNone/>
-            </a:pPr>
-            <a:r>
-              <a:rPr lang="en" sz="2000" dirty="0"/>
-              <a:t>Email: </a:t>
-            </a:r>
-            <a:r>
-              <a:rPr lang="en" sz="2000" u="sng" dirty="0">
-                <a:solidFill>
-                  <a:schemeClr val="hlink"/>
-                </a:solidFill>
-                <a:hlinkClick r:id="rId4"/>
-              </a:rPr>
-              <a:t>chris.sippel@magnetforensics.com</a:t>
-            </a:r>
-          </a:p>
-          <a:p>
-            <a:pPr algn="ctr" rtl="0">
-              <a:spcBef>
-                <a:spcPts val="0"/>
-              </a:spcBef>
-              <a:buNone/>
-            </a:pPr>
-            <a:r>
-              <a:rPr lang="en" sz="2000" u="sng" dirty="0">
-                <a:solidFill>
-                  <a:schemeClr val="hlink"/>
-                </a:solidFill>
-                <a:hlinkClick r:id="rId5"/>
-              </a:rPr>
-              <a:t>chris_sippel@hotmail.com</a:t>
-            </a:r>
-          </a:p>
-          <a:p>
-            <a:pPr algn="ctr" rtl="0">
-              <a:spcBef>
-                <a:spcPts val="0"/>
-              </a:spcBef>
-              <a:buNone/>
-            </a:pPr>
-            <a:endParaRPr sz="2000" dirty="0"/>
-          </a:p>
-          <a:p>
-            <a:pPr algn="ctr">
-              <a:spcBef>
-                <a:spcPts val="0"/>
-              </a:spcBef>
-              <a:buNone/>
-            </a:pPr>
-            <a:endParaRPr dirty="0"/>
+            <a:pPr marL="457200" lvl="0" indent="-419100" rtl="0">
+              <a:spcBef>
+                <a:spcPts val="0"/>
+              </a:spcBef>
+              <a:buClr>
+                <a:srgbClr val="000000"/>
+              </a:buClr>
+              <a:buSzPct val="100000"/>
+              <a:buFont typeface="Arial"/>
+              <a:buAutoNum type="arabicPeriod"/>
+            </a:pPr>
+            <a:r>
+              <a:rPr lang="en" dirty="0"/>
+              <a:t>.NET 4.5</a:t>
+            </a:r>
+          </a:p>
+          <a:p>
+            <a:pPr marL="914400" lvl="1" indent="-381000" rtl="0">
+              <a:spcBef>
+                <a:spcPts val="0"/>
+              </a:spcBef>
+              <a:buClr>
+                <a:srgbClr val="000000"/>
+              </a:buClr>
+              <a:buSzPct val="80000"/>
+              <a:buFont typeface="Arial"/>
+              <a:buAutoNum type="alphaLcPeriod"/>
+            </a:pPr>
+            <a:r>
+              <a:rPr lang="en" dirty="0"/>
+              <a:t>Async/Await</a:t>
+            </a:r>
+          </a:p>
+          <a:p>
+            <a:pPr marL="914400" lvl="1" indent="-381000" rtl="0">
+              <a:spcBef>
+                <a:spcPts val="0"/>
+              </a:spcBef>
+              <a:buClr>
+                <a:srgbClr val="000000"/>
+              </a:buClr>
+              <a:buSzPct val="80000"/>
+              <a:buFont typeface="Arial"/>
+              <a:buAutoNum type="alphaLcPeriod"/>
+            </a:pPr>
+            <a:r>
+              <a:rPr lang="en" dirty="0" smtClean="0"/>
+              <a:t>Tasks</a:t>
+            </a:r>
+          </a:p>
+          <a:p>
+            <a:pPr marL="457200" lvl="0" indent="-419100" rtl="0">
+              <a:spcBef>
+                <a:spcPts val="0"/>
+              </a:spcBef>
+              <a:buClr>
+                <a:srgbClr val="000000"/>
+              </a:buClr>
+              <a:buSzPct val="100000"/>
+              <a:buFont typeface="Arial"/>
+              <a:buAutoNum type="arabicPeriod"/>
+            </a:pPr>
+            <a:r>
+              <a:rPr lang="en" dirty="0" smtClean="0"/>
+              <a:t>Questions</a:t>
+            </a:r>
+          </a:p>
+          <a:p>
+            <a:pPr marL="457200" lvl="0" indent="-419100" rtl="0">
+              <a:spcBef>
+                <a:spcPts val="0"/>
+              </a:spcBef>
+              <a:buClr>
+                <a:srgbClr val="000000"/>
+              </a:buClr>
+              <a:buSzPct val="100000"/>
+              <a:buFont typeface="Arial"/>
+              <a:buAutoNum type="arabicPeriod"/>
+            </a:pPr>
+            <a:r>
+              <a:rPr lang="en" dirty="0" smtClean="0"/>
+              <a:t>Potential Exercises</a:t>
+            </a:r>
+            <a:endParaRPr lang="en" dirty="0"/>
           </a:p>
         </p:txBody>
       </p:sp>
@@ -8663,6 +9486,267 @@
   <p:cSld>
     <p:spTree>
       <p:nvGrpSpPr>
+        <p:cNvPr id="1" name="Shape 47"/>
+        <p:cNvGrpSpPr/>
+        <p:nvPr/>
+      </p:nvGrpSpPr>
+      <p:grpSpPr>
+        <a:xfrm>
+          <a:off x="0" y="0"/>
+          <a:ext cx="0" cy="0"/>
+          <a:chOff x="0" y="0"/>
+          <a:chExt cx="0" cy="0"/>
+        </a:xfrm>
+      </p:grpSpPr>
+      <p:sp>
+        <p:nvSpPr>
+          <p:cNvPr id="48" name="Shape 48"/>
+          <p:cNvSpPr txBox="1">
+            <a:spLocks noGrp="1"/>
+          </p:cNvSpPr>
+          <p:nvPr>
+            <p:ph type="title"/>
+          </p:nvPr>
+        </p:nvSpPr>
+        <p:spPr>
+          <a:xfrm>
+            <a:off x="457200" y="205978"/>
+            <a:ext cx="8229600" cy="857400"/>
+          </a:xfrm>
+          <a:prstGeom prst="rect">
+            <a:avLst/>
+          </a:prstGeom>
+        </p:spPr>
+        <p:txBody>
+          <a:bodyPr lIns="91425" tIns="91425" rIns="91425" bIns="91425" anchor="b" anchorCtr="0">
+            <a:noAutofit/>
+          </a:bodyPr>
+          <a:lstStyle/>
+          <a:p>
+            <a:pPr>
+              <a:spcBef>
+                <a:spcPts val="0"/>
+              </a:spcBef>
+              <a:buNone/>
+            </a:pPr>
+            <a:r>
+              <a:rPr lang="en"/>
+              <a:t>Who the heck is this guy?</a:t>
+            </a:r>
+          </a:p>
+        </p:txBody>
+      </p:sp>
+      <p:sp>
+        <p:nvSpPr>
+          <p:cNvPr id="49" name="Shape 49"/>
+          <p:cNvSpPr txBox="1">
+            <a:spLocks noGrp="1"/>
+          </p:cNvSpPr>
+          <p:nvPr>
+            <p:ph type="body" idx="1"/>
+          </p:nvPr>
+        </p:nvSpPr>
+        <p:spPr>
+          <a:xfrm>
+            <a:off x="457200" y="1200150"/>
+            <a:ext cx="8229600" cy="3725699"/>
+          </a:xfrm>
+          <a:prstGeom prst="rect">
+            <a:avLst/>
+          </a:prstGeom>
+        </p:spPr>
+        <p:txBody>
+          <a:bodyPr lIns="91425" tIns="91425" rIns="91425" bIns="91425" anchor="t" anchorCtr="0">
+            <a:noAutofit/>
+          </a:bodyPr>
+          <a:lstStyle/>
+          <a:p>
+            <a:pPr algn="ctr" rtl="0">
+              <a:spcBef>
+                <a:spcPts val="0"/>
+              </a:spcBef>
+              <a:buNone/>
+            </a:pPr>
+            <a:r>
+              <a:rPr lang="en" sz="2000" dirty="0"/>
+              <a:t>Chris Sippel</a:t>
+            </a:r>
+          </a:p>
+          <a:p>
+            <a:pPr algn="ctr" rtl="0">
+              <a:spcBef>
+                <a:spcPts val="0"/>
+              </a:spcBef>
+              <a:buNone/>
+            </a:pPr>
+            <a:r>
+              <a:rPr lang="en" sz="2000" dirty="0"/>
+              <a:t>Developing software for 9 years</a:t>
+            </a:r>
+          </a:p>
+          <a:p>
+            <a:pPr algn="ctr" rtl="0">
+              <a:spcBef>
+                <a:spcPts val="0"/>
+              </a:spcBef>
+              <a:buNone/>
+            </a:pPr>
+            <a:r>
+              <a:rPr lang="en" sz="2000" dirty="0"/>
+              <a:t>Graduated from Conestoga College in 2014</a:t>
+            </a:r>
+          </a:p>
+          <a:p>
+            <a:pPr algn="ctr" rtl="0">
+              <a:spcBef>
+                <a:spcPts val="0"/>
+              </a:spcBef>
+              <a:buNone/>
+            </a:pPr>
+            <a:r>
+              <a:rPr lang="en" sz="2000" dirty="0"/>
+              <a:t>Has 8 apps on the Windows </a:t>
+            </a:r>
+            <a:r>
+              <a:rPr lang="en" sz="2000" dirty="0" smtClean="0"/>
+              <a:t>Phone Market Place </a:t>
+            </a:r>
+            <a:r>
+              <a:rPr lang="en" sz="2000" dirty="0"/>
+              <a:t>with </a:t>
+            </a:r>
+            <a:r>
+              <a:rPr lang="en" sz="2000" dirty="0" smtClean="0"/>
+              <a:t>a </a:t>
+            </a:r>
+            <a:r>
+              <a:rPr lang="en" sz="2000" dirty="0"/>
+              <a:t>total of 11,000 downloads</a:t>
+            </a:r>
+          </a:p>
+          <a:p>
+            <a:pPr algn="ctr" rtl="0">
+              <a:spcBef>
+                <a:spcPts val="0"/>
+              </a:spcBef>
+              <a:buNone/>
+            </a:pPr>
+            <a:endParaRPr sz="2000" dirty="0"/>
+          </a:p>
+          <a:p>
+            <a:pPr algn="ctr" rtl="0">
+              <a:spcBef>
+                <a:spcPts val="0"/>
+              </a:spcBef>
+              <a:buNone/>
+            </a:pPr>
+            <a:r>
+              <a:rPr lang="en" sz="2000" dirty="0"/>
+              <a:t>LinkedIn: </a:t>
+            </a:r>
+            <a:r>
+              <a:rPr lang="en" sz="2000" u="sng" dirty="0">
+                <a:solidFill>
+                  <a:schemeClr val="hlink"/>
+                </a:solidFill>
+                <a:hlinkClick r:id="rId3"/>
+              </a:rPr>
+              <a:t>https://www.linkedin.com/in/chrissippel</a:t>
+            </a:r>
+          </a:p>
+          <a:p>
+            <a:pPr algn="ctr" rtl="0">
+              <a:spcBef>
+                <a:spcPts val="0"/>
+              </a:spcBef>
+              <a:buNone/>
+            </a:pPr>
+            <a:r>
+              <a:rPr lang="en" sz="2000" dirty="0"/>
+              <a:t>Twitter: @Chris_Sippel</a:t>
+            </a:r>
+          </a:p>
+          <a:p>
+            <a:pPr algn="ctr" rtl="0">
+              <a:spcBef>
+                <a:spcPts val="0"/>
+              </a:spcBef>
+              <a:buNone/>
+            </a:pPr>
+            <a:r>
+              <a:rPr lang="en" sz="2000" dirty="0"/>
+              <a:t>Email: </a:t>
+            </a:r>
+            <a:r>
+              <a:rPr lang="en" sz="2000" u="sng" dirty="0">
+                <a:solidFill>
+                  <a:schemeClr val="hlink"/>
+                </a:solidFill>
+                <a:hlinkClick r:id="rId4"/>
+              </a:rPr>
+              <a:t>chris.sippel@magnetforensics.com</a:t>
+            </a:r>
+          </a:p>
+          <a:p>
+            <a:pPr algn="ctr" rtl="0">
+              <a:spcBef>
+                <a:spcPts val="0"/>
+              </a:spcBef>
+              <a:buNone/>
+            </a:pPr>
+            <a:r>
+              <a:rPr lang="en" sz="2000" u="sng" dirty="0">
+                <a:solidFill>
+                  <a:schemeClr val="hlink"/>
+                </a:solidFill>
+                <a:hlinkClick r:id="rId5"/>
+              </a:rPr>
+              <a:t>chris_sippel@hotmail.com</a:t>
+            </a:r>
+          </a:p>
+          <a:p>
+            <a:pPr algn="ctr" rtl="0">
+              <a:spcBef>
+                <a:spcPts val="0"/>
+              </a:spcBef>
+              <a:buNone/>
+            </a:pPr>
+            <a:endParaRPr sz="2000" dirty="0"/>
+          </a:p>
+          <a:p>
+            <a:pPr algn="ctr">
+              <a:spcBef>
+                <a:spcPts val="0"/>
+              </a:spcBef>
+              <a:buNone/>
+            </a:pPr>
+            <a:endParaRPr dirty="0"/>
+          </a:p>
+        </p:txBody>
+      </p:sp>
+    </p:spTree>
+  </p:cSld>
+  <p:clrMapOvr>
+    <a:masterClrMapping/>
+  </p:clrMapOvr>
+  <p:transition spd="slow">
+    <p:cut/>
+  </p:transition>
+  <p:timing>
+    <p:tnLst>
+      <p:par>
+        <p:cTn id="1" dur="indefinite" restart="never" nodeType="tmRoot"/>
+      </p:par>
+    </p:tnLst>
+  </p:timing>
+</p:sld>
+</file>
+
+<file path=ppt/slides/slide6.xml><?xml version="1.0" encoding="utf-8"?>
+<p:sld xmlns:a="http://schemas.openxmlformats.org/drawingml/2006/main" xmlns:r="http://schemas.openxmlformats.org/officeDocument/2006/relationships" xmlns:p="http://schemas.openxmlformats.org/presentationml/2006/main">
+  <p:cSld>
+    <p:spTree>
+      <p:nvGrpSpPr>
         <p:cNvPr id="1" name=""/>
         <p:cNvGrpSpPr/>
         <p:nvPr/>
@@ -8776,7 +9860,7 @@
 </p:sld>
 </file>
 
-<file path=ppt/slides/slide6.xml><?xml version="1.0" encoding="utf-8"?>
+<file path=ppt/slides/slide7.xml><?xml version="1.0" encoding="utf-8"?>
 <p:sld xmlns:a="http://schemas.openxmlformats.org/drawingml/2006/main" xmlns:r="http://schemas.openxmlformats.org/officeDocument/2006/relationships" xmlns:p="http://schemas.openxmlformats.org/presentationml/2006/main">
   <p:cSld>
     <p:spTree>
@@ -9095,7 +10179,7 @@
 </p:sld>
 </file>
 
-<file path=ppt/slides/slide7.xml><?xml version="1.0" encoding="utf-8"?>
+<file path=ppt/slides/slide8.xml><?xml version="1.0" encoding="utf-8"?>
 <p:sld xmlns:a="http://schemas.openxmlformats.org/drawingml/2006/main" xmlns:r="http://schemas.openxmlformats.org/officeDocument/2006/relationships" xmlns:p="http://schemas.openxmlformats.org/presentationml/2006/main">
   <p:cSld>
     <p:spTree>
@@ -9158,7 +10242,7 @@
 </p:sld>
 </file>
 
-<file path=ppt/slides/slide8.xml><?xml version="1.0" encoding="utf-8"?>
+<file path=ppt/slides/slide9.xml><?xml version="1.0" encoding="utf-8"?>
 <p:sld xmlns:a="http://schemas.openxmlformats.org/drawingml/2006/main" xmlns:r="http://schemas.openxmlformats.org/officeDocument/2006/relationships" xmlns:p="http://schemas.openxmlformats.org/presentationml/2006/main">
   <p:cSld>
     <p:spTree>
@@ -9345,211 +10429,6 @@
           </a:p>
         </p:txBody>
       </p:sp>
-    </p:spTree>
-  </p:cSld>
-  <p:clrMapOvr>
-    <a:masterClrMapping/>
-  </p:clrMapOvr>
-  <p:transition spd="slow">
-    <p:cut/>
-  </p:transition>
-  <p:timing>
-    <p:tnLst>
-      <p:par>
-        <p:cTn id="1" dur="indefinite" restart="never" nodeType="tmRoot"/>
-      </p:par>
-    </p:tnLst>
-  </p:timing>
-</p:sld>
-</file>
-
-<file path=ppt/slides/slide9.xml><?xml version="1.0" encoding="utf-8"?>
-<p:sld xmlns:a="http://schemas.openxmlformats.org/drawingml/2006/main" xmlns:r="http://schemas.openxmlformats.org/officeDocument/2006/relationships" xmlns:p="http://schemas.openxmlformats.org/presentationml/2006/main">
-  <p:cSld>
-    <p:spTree>
-      <p:nvGrpSpPr>
-        <p:cNvPr id="1" name="Shape 80"/>
-        <p:cNvGrpSpPr/>
-        <p:nvPr/>
-      </p:nvGrpSpPr>
-      <p:grpSpPr>
-        <a:xfrm>
-          <a:off x="0" y="0"/>
-          <a:ext cx="0" cy="0"/>
-          <a:chOff x="0" y="0"/>
-          <a:chExt cx="0" cy="0"/>
-        </a:xfrm>
-      </p:grpSpPr>
-      <p:sp>
-        <p:nvSpPr>
-          <p:cNvPr id="81" name="Shape 81"/>
-          <p:cNvSpPr txBox="1">
-            <a:spLocks noGrp="1"/>
-          </p:cNvSpPr>
-          <p:nvPr>
-            <p:ph type="title"/>
-          </p:nvPr>
-        </p:nvSpPr>
-        <p:spPr>
-          <a:xfrm>
-            <a:off x="457200" y="205978"/>
-            <a:ext cx="8229600" cy="857400"/>
-          </a:xfrm>
-          <a:prstGeom prst="rect">
-            <a:avLst/>
-          </a:prstGeom>
-        </p:spPr>
-        <p:txBody>
-          <a:bodyPr lIns="91425" tIns="91425" rIns="91425" bIns="91425" anchor="b" anchorCtr="0">
-            <a:noAutofit/>
-          </a:bodyPr>
-          <a:lstStyle/>
-          <a:p>
-            <a:pPr>
-              <a:spcBef>
-                <a:spcPts val="0"/>
-              </a:spcBef>
-              <a:buNone/>
-            </a:pPr>
-            <a:r>
-              <a:rPr lang="en"/>
-              <a:t>Cont.</a:t>
-            </a:r>
-          </a:p>
-        </p:txBody>
-      </p:sp>
-      <p:sp>
-        <p:nvSpPr>
-          <p:cNvPr id="82" name="Shape 82"/>
-          <p:cNvSpPr txBox="1"/>
-          <p:nvPr/>
-        </p:nvSpPr>
-        <p:spPr>
-          <a:xfrm>
-            <a:off x="457200" y="976425"/>
-            <a:ext cx="5428799" cy="466799"/>
-          </a:xfrm>
-          <a:prstGeom prst="rect">
-            <a:avLst/>
-          </a:prstGeom>
-          <a:noFill/>
-          <a:ln>
-            <a:noFill/>
-          </a:ln>
-        </p:spPr>
-        <p:txBody>
-          <a:bodyPr lIns="91425" tIns="91425" rIns="91425" bIns="91425" anchor="t" anchorCtr="0">
-            <a:noAutofit/>
-          </a:bodyPr>
-          <a:lstStyle/>
-          <a:p>
-            <a:pPr lvl="0" rtl="0">
-              <a:spcBef>
-                <a:spcPts val="0"/>
-              </a:spcBef>
-              <a:buNone/>
-            </a:pPr>
-            <a:r>
-              <a:rPr lang="en" sz="1800"/>
-              <a:t>Creating a Thread using an anonymous delegate</a:t>
-            </a:r>
-          </a:p>
-        </p:txBody>
-      </p:sp>
-      <p:sp>
-        <p:nvSpPr>
-          <p:cNvPr id="83" name="Shape 83"/>
-          <p:cNvSpPr txBox="1"/>
-          <p:nvPr/>
-        </p:nvSpPr>
-        <p:spPr>
-          <a:xfrm>
-            <a:off x="457200" y="2956300"/>
-            <a:ext cx="7649399" cy="466799"/>
-          </a:xfrm>
-          <a:prstGeom prst="rect">
-            <a:avLst/>
-          </a:prstGeom>
-          <a:noFill/>
-          <a:ln>
-            <a:noFill/>
-          </a:ln>
-        </p:spPr>
-        <p:txBody>
-          <a:bodyPr lIns="91425" tIns="91425" rIns="91425" bIns="91425" anchor="t" anchorCtr="0">
-            <a:noAutofit/>
-          </a:bodyPr>
-          <a:lstStyle/>
-          <a:p>
-            <a:pPr lvl="0" rtl="0">
-              <a:spcBef>
-                <a:spcPts val="0"/>
-              </a:spcBef>
-              <a:buNone/>
-            </a:pPr>
-            <a:r>
-              <a:rPr lang="en" sz="1800"/>
-              <a:t>Creating a Thread using an anonymous delegate that takes a parameter</a:t>
-            </a:r>
-          </a:p>
-        </p:txBody>
-      </p:sp>
-      <p:pic>
-        <p:nvPicPr>
-          <p:cNvPr id="84" name="Shape 84"/>
-          <p:cNvPicPr preferRelativeResize="0"/>
-          <p:nvPr/>
-        </p:nvPicPr>
-        <p:blipFill>
-          <a:blip r:embed="rId3">
-            <a:alphaModFix/>
-          </a:blip>
-          <a:stretch>
-            <a:fillRect/>
-          </a:stretch>
-        </p:blipFill>
-        <p:spPr>
-          <a:xfrm>
-            <a:off x="457200" y="1443225"/>
-            <a:ext cx="5743575" cy="1514475"/>
-          </a:xfrm>
-          <a:prstGeom prst="rect">
-            <a:avLst/>
-          </a:prstGeom>
-          <a:noFill/>
-          <a:ln>
-            <a:noFill/>
-          </a:ln>
-        </p:spPr>
-      </p:pic>
-      <p:pic>
-        <p:nvPicPr>
-          <p:cNvPr id="85" name="Shape 85"/>
-          <p:cNvPicPr preferRelativeResize="0"/>
-          <p:nvPr/>
-        </p:nvPicPr>
-        <p:blipFill>
-          <a:blip r:embed="rId4">
-            <a:alphaModFix/>
-          </a:blip>
-          <a:stretch>
-            <a:fillRect/>
-          </a:stretch>
-        </p:blipFill>
-        <p:spPr>
-          <a:xfrm>
-            <a:off x="457200" y="3423100"/>
-            <a:ext cx="6591300" cy="1504950"/>
-          </a:xfrm>
-          <a:prstGeom prst="rect">
-            <a:avLst/>
-          </a:prstGeom>
-          <a:noFill/>
-          <a:ln>
-            <a:noFill/>
-          </a:ln>
-        </p:spPr>
-      </p:pic>
     </p:spTree>
   </p:cSld>
   <p:clrMapOvr>

</xml_diff>

<commit_message>
Improvements to the intro/finale slide
</commit_message>
<xml_diff>
--- a/C# Threading.pptx
+++ b/C# Threading.pptx
@@ -542,7 +542,12 @@
             <p:ph type="sldImg"/>
           </p:nvPr>
         </p:nvSpPr>
-        <p:spPr/>
+        <p:spPr>
+          <a:xfrm>
+            <a:off x="381000" y="685800"/>
+            <a:ext cx="6096000" cy="3429000"/>
+          </a:xfrm>
+        </p:spPr>
       </p:sp>
       <p:sp>
         <p:nvSpPr>
@@ -2683,7 +2688,12 @@
             <p:ph type="sldImg"/>
           </p:nvPr>
         </p:nvSpPr>
-        <p:spPr/>
+        <p:spPr>
+          <a:xfrm>
+            <a:off x="381000" y="685800"/>
+            <a:ext cx="6096000" cy="3429000"/>
+          </a:xfrm>
+        </p:spPr>
       </p:sp>
       <p:sp>
         <p:nvSpPr>
@@ -6019,7 +6029,7 @@
         <p:spPr>
           <a:xfrm>
             <a:off x="990600" y="3028950"/>
-            <a:ext cx="6324600" cy="1421928"/>
+            <a:ext cx="7037784" cy="1421928"/>
           </a:xfrm>
           <a:prstGeom prst="rect">
             <a:avLst/>
@@ -6132,7 +6142,23 @@
                   <a:srgbClr val="FFFFFF"/>
                 </a:solidFill>
               </a:rPr>
-              <a:t>: https://github.com/CSharpDevConnect/</a:t>
+              <a:t>: </a:t>
+            </a:r>
+            <a:r>
+              <a:rPr lang="en-US" sz="2400" dirty="0" smtClean="0">
+                <a:solidFill>
+                  <a:srgbClr val="FFFFFF"/>
+                </a:solidFill>
+              </a:rPr>
+              <a:t>https</a:t>
+            </a:r>
+            <a:r>
+              <a:rPr lang="en-US" sz="2400" dirty="0">
+                <a:solidFill>
+                  <a:srgbClr val="FFFFFF"/>
+                </a:solidFill>
+              </a:rPr>
+              <a:t>://github.com/CSharpDevConnect/</a:t>
             </a:r>
             <a:endParaRPr lang="en-US" sz="2400" dirty="0" smtClean="0">
               <a:solidFill>
@@ -8929,7 +8955,7 @@
         <p:spPr>
           <a:xfrm>
             <a:off x="990600" y="3028950"/>
-            <a:ext cx="6324600" cy="1421928"/>
+            <a:ext cx="7109792" cy="1421928"/>
           </a:xfrm>
           <a:prstGeom prst="rect">
             <a:avLst/>

</xml_diff>